<commit_message>
Clase 2 Modulo 4
</commit_message>
<xml_diff>
--- a/Material pedagógico/Modulo 2/Clase 4/Clase 4 - Modulo 2.pptx
+++ b/Material pedagógico/Modulo 2/Clase 4/Clase 4 - Modulo 2.pptx
@@ -364,7 +364,7 @@
             <a:pPr indent="0" algn="r">
               <a:buNone/>
             </a:pPr>
-            <a:fld id="{6A30DB16-AD82-4673-8516-01494AF27057}" type="slidenum">
+            <a:fld id="{3C146F68-DD93-4E7D-889C-44AA8AFC39BB}" type="slidenum">
               <a:rPr b="0" lang="es-CO" sz="1400" spc="-1" strike="noStrike">
                 <a:solidFill>
                   <a:srgbClr val="000000"/>
@@ -418,7 +418,7 @@
         <p:spPr>
           <a:xfrm>
             <a:off x="685800" y="1143000"/>
-            <a:ext cx="5484240" cy="3084120"/>
+            <a:ext cx="5483880" cy="3083760"/>
           </a:xfrm>
           <a:prstGeom prst="rect">
             <a:avLst/>
@@ -441,7 +441,7 @@
         <p:spPr>
           <a:xfrm>
             <a:off x="685800" y="4400640"/>
-            <a:ext cx="5484240" cy="3598560"/>
+            <a:ext cx="5483880" cy="3598200"/>
           </a:xfrm>
           <a:prstGeom prst="rect">
             <a:avLst/>
@@ -481,7 +481,7 @@
         <p:spPr>
           <a:xfrm>
             <a:off x="3884760" y="8685360"/>
-            <a:ext cx="2969640" cy="456480"/>
+            <a:ext cx="2969280" cy="456120"/>
           </a:xfrm>
           <a:prstGeom prst="rect">
             <a:avLst/>
@@ -522,7 +522,7 @@
                 <a:tab algn="l" pos="0"/>
               </a:tabLst>
             </a:pPr>
-            <a:fld id="{98C54FF9-4CBE-4E13-95EB-564E6AC9A7E3}" type="slidenum">
+            <a:fld id="{40EF98BD-FD1A-40A2-8B39-04943E92AC76}" type="slidenum">
               <a:rPr b="0" lang="es-CO" sz="1400" spc="-1" strike="noStrike">
                 <a:solidFill>
                   <a:srgbClr val="000000"/>
@@ -575,7 +575,7 @@
         <p:spPr>
           <a:xfrm>
             <a:off x="685800" y="1143000"/>
-            <a:ext cx="5484240" cy="3084120"/>
+            <a:ext cx="5483880" cy="3083760"/>
           </a:xfrm>
           <a:prstGeom prst="rect">
             <a:avLst/>
@@ -598,7 +598,7 @@
         <p:spPr>
           <a:xfrm>
             <a:off x="685800" y="4400640"/>
-            <a:ext cx="5484240" cy="3598560"/>
+            <a:ext cx="5483880" cy="3598200"/>
           </a:xfrm>
           <a:prstGeom prst="rect">
             <a:avLst/>
@@ -638,7 +638,7 @@
         <p:spPr>
           <a:xfrm>
             <a:off x="3884760" y="8685360"/>
-            <a:ext cx="2969640" cy="456480"/>
+            <a:ext cx="2969280" cy="456120"/>
           </a:xfrm>
           <a:prstGeom prst="rect">
             <a:avLst/>
@@ -679,7 +679,7 @@
                 <a:tab algn="l" pos="0"/>
               </a:tabLst>
             </a:pPr>
-            <a:fld id="{D29CE8A2-493B-49EC-B4D6-0737D52EEA14}" type="slidenum">
+            <a:fld id="{3BD09427-8DCA-4447-9E95-EDF407003FDF}" type="slidenum">
               <a:rPr b="0" lang="es-CO" sz="1400" spc="-1" strike="noStrike">
                 <a:solidFill>
                   <a:srgbClr val="000000"/>
@@ -732,7 +732,7 @@
         <p:spPr>
           <a:xfrm>
             <a:off x="685800" y="1143000"/>
-            <a:ext cx="5484240" cy="3084120"/>
+            <a:ext cx="5483880" cy="3083760"/>
           </a:xfrm>
           <a:prstGeom prst="rect">
             <a:avLst/>
@@ -755,7 +755,7 @@
         <p:spPr>
           <a:xfrm>
             <a:off x="685800" y="4400640"/>
-            <a:ext cx="5484240" cy="3598560"/>
+            <a:ext cx="5483880" cy="3598200"/>
           </a:xfrm>
           <a:prstGeom prst="rect">
             <a:avLst/>
@@ -795,7 +795,7 @@
         <p:spPr>
           <a:xfrm>
             <a:off x="3884760" y="8685360"/>
-            <a:ext cx="2969640" cy="456480"/>
+            <a:ext cx="2969280" cy="456120"/>
           </a:xfrm>
           <a:prstGeom prst="rect">
             <a:avLst/>
@@ -836,7 +836,7 @@
                 <a:tab algn="l" pos="0"/>
               </a:tabLst>
             </a:pPr>
-            <a:fld id="{AA7FD62C-F827-4AF7-BD67-17457784A4B3}" type="slidenum">
+            <a:fld id="{B0D0D5F6-A830-48BA-B2C2-63B57F8E16CE}" type="slidenum">
               <a:rPr b="0" lang="es-CO" sz="1400" spc="-1" strike="noStrike">
                 <a:solidFill>
                   <a:srgbClr val="000000"/>
@@ -889,7 +889,7 @@
         <p:spPr>
           <a:xfrm>
             <a:off x="685800" y="1143000"/>
-            <a:ext cx="5484240" cy="3084120"/>
+            <a:ext cx="5483880" cy="3083760"/>
           </a:xfrm>
           <a:prstGeom prst="rect">
             <a:avLst/>
@@ -912,7 +912,7 @@
         <p:spPr>
           <a:xfrm>
             <a:off x="685800" y="4400640"/>
-            <a:ext cx="5484240" cy="3598560"/>
+            <a:ext cx="5483880" cy="3598200"/>
           </a:xfrm>
           <a:prstGeom prst="rect">
             <a:avLst/>
@@ -952,7 +952,7 @@
         <p:spPr>
           <a:xfrm>
             <a:off x="3884760" y="8685360"/>
-            <a:ext cx="2969640" cy="456480"/>
+            <a:ext cx="2969280" cy="456120"/>
           </a:xfrm>
           <a:prstGeom prst="rect">
             <a:avLst/>
@@ -993,7 +993,7 @@
                 <a:tab algn="l" pos="0"/>
               </a:tabLst>
             </a:pPr>
-            <a:fld id="{3AB26ED3-7ACE-44E0-9FCC-AACBFAA87F17}" type="slidenum">
+            <a:fld id="{017CFE89-34BD-409E-8EA4-31217528774F}" type="slidenum">
               <a:rPr b="0" lang="es-CO" sz="1400" spc="-1" strike="noStrike">
                 <a:solidFill>
                   <a:srgbClr val="000000"/>
@@ -1046,7 +1046,7 @@
         <p:spPr>
           <a:xfrm>
             <a:off x="685800" y="1143000"/>
-            <a:ext cx="5484240" cy="3084120"/>
+            <a:ext cx="5483880" cy="3083760"/>
           </a:xfrm>
           <a:prstGeom prst="rect">
             <a:avLst/>
@@ -1069,7 +1069,7 @@
         <p:spPr>
           <a:xfrm>
             <a:off x="685800" y="4400640"/>
-            <a:ext cx="5484240" cy="3598560"/>
+            <a:ext cx="5483880" cy="3598200"/>
           </a:xfrm>
           <a:prstGeom prst="rect">
             <a:avLst/>
@@ -1109,7 +1109,7 @@
         <p:spPr>
           <a:xfrm>
             <a:off x="3884760" y="8685360"/>
-            <a:ext cx="2969640" cy="456480"/>
+            <a:ext cx="2969280" cy="456120"/>
           </a:xfrm>
           <a:prstGeom prst="rect">
             <a:avLst/>
@@ -1150,7 +1150,7 @@
                 <a:tab algn="l" pos="0"/>
               </a:tabLst>
             </a:pPr>
-            <a:fld id="{A75ED263-FF27-441E-8298-608E2506DC9A}" type="slidenum">
+            <a:fld id="{8722B6BC-A1FA-4ABF-81D7-E9F4C4A1E465}" type="slidenum">
               <a:rPr b="0" lang="es-CO" sz="1400" spc="-1" strike="noStrike">
                 <a:solidFill>
                   <a:srgbClr val="000000"/>
@@ -1203,7 +1203,7 @@
         <p:spPr>
           <a:xfrm>
             <a:off x="685800" y="1143000"/>
-            <a:ext cx="5484240" cy="3084120"/>
+            <a:ext cx="5483880" cy="3083760"/>
           </a:xfrm>
           <a:prstGeom prst="rect">
             <a:avLst/>
@@ -1226,7 +1226,7 @@
         <p:spPr>
           <a:xfrm>
             <a:off x="685800" y="4400640"/>
-            <a:ext cx="5484240" cy="3598560"/>
+            <a:ext cx="5483880" cy="3598200"/>
           </a:xfrm>
           <a:prstGeom prst="rect">
             <a:avLst/>
@@ -1266,7 +1266,7 @@
         <p:spPr>
           <a:xfrm>
             <a:off x="3884760" y="8685360"/>
-            <a:ext cx="2969640" cy="456480"/>
+            <a:ext cx="2969280" cy="456120"/>
           </a:xfrm>
           <a:prstGeom prst="rect">
             <a:avLst/>
@@ -1307,7 +1307,7 @@
                 <a:tab algn="l" pos="0"/>
               </a:tabLst>
             </a:pPr>
-            <a:fld id="{0C1A093C-D9E0-42D6-B34F-06AE82615DF5}" type="slidenum">
+            <a:fld id="{5FBE1F86-D1E0-4D7A-8428-10902B1D4A37}" type="slidenum">
               <a:rPr b="0" lang="es-CO" sz="1400" spc="-1" strike="noStrike">
                 <a:solidFill>
                   <a:srgbClr val="000000"/>
@@ -1360,7 +1360,7 @@
         <p:spPr>
           <a:xfrm>
             <a:off x="685800" y="1143000"/>
-            <a:ext cx="5484240" cy="3084120"/>
+            <a:ext cx="5483880" cy="3083760"/>
           </a:xfrm>
           <a:prstGeom prst="rect">
             <a:avLst/>
@@ -1383,7 +1383,7 @@
         <p:spPr>
           <a:xfrm>
             <a:off x="685800" y="4400640"/>
-            <a:ext cx="5484240" cy="3598560"/>
+            <a:ext cx="5483880" cy="3598200"/>
           </a:xfrm>
           <a:prstGeom prst="rect">
             <a:avLst/>
@@ -1423,7 +1423,7 @@
         <p:spPr>
           <a:xfrm>
             <a:off x="3884760" y="8685360"/>
-            <a:ext cx="2969640" cy="456480"/>
+            <a:ext cx="2969280" cy="456120"/>
           </a:xfrm>
           <a:prstGeom prst="rect">
             <a:avLst/>
@@ -1464,7 +1464,7 @@
                 <a:tab algn="l" pos="0"/>
               </a:tabLst>
             </a:pPr>
-            <a:fld id="{BD31ADC0-5CAB-4FAF-A39D-DB4952E0A2F8}" type="slidenum">
+            <a:fld id="{6D613DED-3B94-477D-B0E2-27156DCD2BEA}" type="slidenum">
               <a:rPr b="0" lang="es-CO" sz="1400" spc="-1" strike="noStrike">
                 <a:solidFill>
                   <a:srgbClr val="000000"/>
@@ -1517,7 +1517,7 @@
         <p:spPr>
           <a:xfrm>
             <a:off x="685800" y="1143000"/>
-            <a:ext cx="5484240" cy="3084120"/>
+            <a:ext cx="5483880" cy="3083760"/>
           </a:xfrm>
           <a:prstGeom prst="rect">
             <a:avLst/>
@@ -1540,7 +1540,7 @@
         <p:spPr>
           <a:xfrm>
             <a:off x="685800" y="4400640"/>
-            <a:ext cx="5484240" cy="3598560"/>
+            <a:ext cx="5483880" cy="3598200"/>
           </a:xfrm>
           <a:prstGeom prst="rect">
             <a:avLst/>
@@ -1580,7 +1580,7 @@
         <p:spPr>
           <a:xfrm>
             <a:off x="3884760" y="8685360"/>
-            <a:ext cx="2969640" cy="456480"/>
+            <a:ext cx="2969280" cy="456120"/>
           </a:xfrm>
           <a:prstGeom prst="rect">
             <a:avLst/>
@@ -1621,7 +1621,7 @@
                 <a:tab algn="l" pos="0"/>
               </a:tabLst>
             </a:pPr>
-            <a:fld id="{B4E912CF-47A3-4944-8DDC-1DD5DFADBEB3}" type="slidenum">
+            <a:fld id="{8D9A05BB-0AC6-47CA-81B1-282AC3367605}" type="slidenum">
               <a:rPr b="0" lang="es-CO" sz="1400" spc="-1" strike="noStrike">
                 <a:solidFill>
                   <a:srgbClr val="000000"/>
@@ -1674,7 +1674,7 @@
         <p:spPr>
           <a:xfrm>
             <a:off x="685800" y="1143000"/>
-            <a:ext cx="5484240" cy="3084120"/>
+            <a:ext cx="5483880" cy="3083760"/>
           </a:xfrm>
           <a:prstGeom prst="rect">
             <a:avLst/>
@@ -1697,7 +1697,7 @@
         <p:spPr>
           <a:xfrm>
             <a:off x="685800" y="4400640"/>
-            <a:ext cx="5484240" cy="3598560"/>
+            <a:ext cx="5483880" cy="3598200"/>
           </a:xfrm>
           <a:prstGeom prst="rect">
             <a:avLst/>
@@ -1737,7 +1737,7 @@
         <p:spPr>
           <a:xfrm>
             <a:off x="3884760" y="8685360"/>
-            <a:ext cx="2969640" cy="456480"/>
+            <a:ext cx="2969280" cy="456120"/>
           </a:xfrm>
           <a:prstGeom prst="rect">
             <a:avLst/>
@@ -1778,7 +1778,7 @@
                 <a:tab algn="l" pos="0"/>
               </a:tabLst>
             </a:pPr>
-            <a:fld id="{0D85E7EE-9F05-4FD4-8203-62D0AC979ECC}" type="slidenum">
+            <a:fld id="{428DBA83-4AEE-4F31-A471-AB11D71F73ED}" type="slidenum">
               <a:rPr b="0" lang="es-CO" sz="1400" spc="-1" strike="noStrike">
                 <a:solidFill>
                   <a:srgbClr val="000000"/>
@@ -1831,7 +1831,7 @@
         <p:spPr>
           <a:xfrm>
             <a:off x="685800" y="1143000"/>
-            <a:ext cx="5484240" cy="3084120"/>
+            <a:ext cx="5483880" cy="3083760"/>
           </a:xfrm>
           <a:prstGeom prst="rect">
             <a:avLst/>
@@ -1854,7 +1854,7 @@
         <p:spPr>
           <a:xfrm>
             <a:off x="685800" y="4400640"/>
-            <a:ext cx="5484240" cy="3598560"/>
+            <a:ext cx="5483880" cy="3598200"/>
           </a:xfrm>
           <a:prstGeom prst="rect">
             <a:avLst/>
@@ -1894,7 +1894,7 @@
         <p:spPr>
           <a:xfrm>
             <a:off x="3884760" y="8685360"/>
-            <a:ext cx="2969640" cy="456480"/>
+            <a:ext cx="2969280" cy="456120"/>
           </a:xfrm>
           <a:prstGeom prst="rect">
             <a:avLst/>
@@ -1935,7 +1935,7 @@
                 <a:tab algn="l" pos="0"/>
               </a:tabLst>
             </a:pPr>
-            <a:fld id="{8657082F-23F2-4D8D-AAB0-A83A6A687A55}" type="slidenum">
+            <a:fld id="{6BBD14A2-D74A-4747-ABC8-1143B4650839}" type="slidenum">
               <a:rPr b="0" lang="es-CO" sz="1400" spc="-1" strike="noStrike">
                 <a:solidFill>
                   <a:srgbClr val="000000"/>
@@ -1988,7 +1988,7 @@
         <p:spPr>
           <a:xfrm>
             <a:off x="685800" y="1143000"/>
-            <a:ext cx="5484240" cy="3084120"/>
+            <a:ext cx="5483880" cy="3083760"/>
           </a:xfrm>
           <a:prstGeom prst="rect">
             <a:avLst/>
@@ -2011,7 +2011,7 @@
         <p:spPr>
           <a:xfrm>
             <a:off x="685800" y="4400640"/>
-            <a:ext cx="5484240" cy="3598560"/>
+            <a:ext cx="5483880" cy="3598200"/>
           </a:xfrm>
           <a:prstGeom prst="rect">
             <a:avLst/>
@@ -2051,7 +2051,7 @@
         <p:spPr>
           <a:xfrm>
             <a:off x="3884760" y="8685360"/>
-            <a:ext cx="2969640" cy="456480"/>
+            <a:ext cx="2969280" cy="456120"/>
           </a:xfrm>
           <a:prstGeom prst="rect">
             <a:avLst/>
@@ -2092,7 +2092,7 @@
                 <a:tab algn="l" pos="0"/>
               </a:tabLst>
             </a:pPr>
-            <a:fld id="{EAB56EEE-2A8E-4E59-875B-86B43D1EA25E}" type="slidenum">
+            <a:fld id="{F311DA8A-38D6-481E-B841-494B80CE2793}" type="slidenum">
               <a:rPr b="0" lang="es-CO" sz="1400" spc="-1" strike="noStrike">
                 <a:solidFill>
                   <a:srgbClr val="000000"/>
@@ -2145,7 +2145,7 @@
         <p:spPr>
           <a:xfrm>
             <a:off x="685800" y="1143000"/>
-            <a:ext cx="5484240" cy="3084120"/>
+            <a:ext cx="5483880" cy="3083760"/>
           </a:xfrm>
           <a:prstGeom prst="rect">
             <a:avLst/>
@@ -2168,7 +2168,7 @@
         <p:spPr>
           <a:xfrm>
             <a:off x="685800" y="4400640"/>
-            <a:ext cx="5484240" cy="3598560"/>
+            <a:ext cx="5483880" cy="3598200"/>
           </a:xfrm>
           <a:prstGeom prst="rect">
             <a:avLst/>
@@ -2208,7 +2208,7 @@
         <p:spPr>
           <a:xfrm>
             <a:off x="3884760" y="8685360"/>
-            <a:ext cx="2969640" cy="456480"/>
+            <a:ext cx="2969280" cy="456120"/>
           </a:xfrm>
           <a:prstGeom prst="rect">
             <a:avLst/>
@@ -2249,7 +2249,7 @@
                 <a:tab algn="l" pos="0"/>
               </a:tabLst>
             </a:pPr>
-            <a:fld id="{001796C0-88BF-4A90-80F7-F20B41BB8C5C}" type="slidenum">
+            <a:fld id="{AD11D38E-2226-438F-920D-A3FF308B7187}" type="slidenum">
               <a:rPr b="0" lang="es-CO" sz="1400" spc="-1" strike="noStrike">
                 <a:solidFill>
                   <a:srgbClr val="000000"/>
@@ -2302,7 +2302,7 @@
         <p:spPr>
           <a:xfrm>
             <a:off x="685800" y="1143000"/>
-            <a:ext cx="5484240" cy="3084120"/>
+            <a:ext cx="5483880" cy="3083760"/>
           </a:xfrm>
           <a:prstGeom prst="rect">
             <a:avLst/>
@@ -2325,7 +2325,7 @@
         <p:spPr>
           <a:xfrm>
             <a:off x="685800" y="4400640"/>
-            <a:ext cx="5484240" cy="3598560"/>
+            <a:ext cx="5483880" cy="3598200"/>
           </a:xfrm>
           <a:prstGeom prst="rect">
             <a:avLst/>
@@ -2365,7 +2365,7 @@
         <p:spPr>
           <a:xfrm>
             <a:off x="3884760" y="8685360"/>
-            <a:ext cx="2969640" cy="456480"/>
+            <a:ext cx="2969280" cy="456120"/>
           </a:xfrm>
           <a:prstGeom prst="rect">
             <a:avLst/>
@@ -2406,7 +2406,7 @@
                 <a:tab algn="l" pos="0"/>
               </a:tabLst>
             </a:pPr>
-            <a:fld id="{1928A8C4-CB3A-41BC-B72F-DBB647FC201D}" type="slidenum">
+            <a:fld id="{1772ACE2-F163-4888-9456-B513AF192B32}" type="slidenum">
               <a:rPr b="0" lang="es-CO" sz="1400" spc="-1" strike="noStrike">
                 <a:solidFill>
                   <a:srgbClr val="000000"/>
@@ -2459,7 +2459,7 @@
         <p:spPr>
           <a:xfrm>
             <a:off x="685800" y="1143000"/>
-            <a:ext cx="5484240" cy="3084120"/>
+            <a:ext cx="5483880" cy="3083760"/>
           </a:xfrm>
           <a:prstGeom prst="rect">
             <a:avLst/>
@@ -2482,7 +2482,7 @@
         <p:spPr>
           <a:xfrm>
             <a:off x="685800" y="4400640"/>
-            <a:ext cx="5484240" cy="3598560"/>
+            <a:ext cx="5483880" cy="3598200"/>
           </a:xfrm>
           <a:prstGeom prst="rect">
             <a:avLst/>
@@ -2522,7 +2522,7 @@
         <p:spPr>
           <a:xfrm>
             <a:off x="3884760" y="8685360"/>
-            <a:ext cx="2969640" cy="456480"/>
+            <a:ext cx="2969280" cy="456120"/>
           </a:xfrm>
           <a:prstGeom prst="rect">
             <a:avLst/>
@@ -2563,7 +2563,7 @@
                 <a:tab algn="l" pos="0"/>
               </a:tabLst>
             </a:pPr>
-            <a:fld id="{FF00DF58-AFA8-4EC8-9259-2A2C185A942E}" type="slidenum">
+            <a:fld id="{52E8EEC2-CEC2-4936-A11E-701D684157C5}" type="slidenum">
               <a:rPr b="0" lang="es-CO" sz="1400" spc="-1" strike="noStrike">
                 <a:solidFill>
                   <a:srgbClr val="000000"/>
@@ -2616,7 +2616,7 @@
         <p:spPr>
           <a:xfrm>
             <a:off x="685800" y="1143000"/>
-            <a:ext cx="5484240" cy="3084120"/>
+            <a:ext cx="5483880" cy="3083760"/>
           </a:xfrm>
           <a:prstGeom prst="rect">
             <a:avLst/>
@@ -2639,7 +2639,7 @@
         <p:spPr>
           <a:xfrm>
             <a:off x="685800" y="4400640"/>
-            <a:ext cx="5484240" cy="3598560"/>
+            <a:ext cx="5483880" cy="3598200"/>
           </a:xfrm>
           <a:prstGeom prst="rect">
             <a:avLst/>
@@ -2679,7 +2679,7 @@
         <p:spPr>
           <a:xfrm>
             <a:off x="3884760" y="8685360"/>
-            <a:ext cx="2969640" cy="456480"/>
+            <a:ext cx="2969280" cy="456120"/>
           </a:xfrm>
           <a:prstGeom prst="rect">
             <a:avLst/>
@@ -2720,7 +2720,7 @@
                 <a:tab algn="l" pos="0"/>
               </a:tabLst>
             </a:pPr>
-            <a:fld id="{E18317BA-3298-47D5-B132-1D71C45B5FF6}" type="slidenum">
+            <a:fld id="{194C467E-0D17-49D3-8025-62E9334C3ED0}" type="slidenum">
               <a:rPr b="0" lang="es-CO" sz="1400" spc="-1" strike="noStrike">
                 <a:solidFill>
                   <a:srgbClr val="000000"/>
@@ -2773,7 +2773,7 @@
         <p:spPr>
           <a:xfrm>
             <a:off x="685800" y="1143000"/>
-            <a:ext cx="5484240" cy="3084120"/>
+            <a:ext cx="5483880" cy="3083760"/>
           </a:xfrm>
           <a:prstGeom prst="rect">
             <a:avLst/>
@@ -2796,7 +2796,7 @@
         <p:spPr>
           <a:xfrm>
             <a:off x="685800" y="4400640"/>
-            <a:ext cx="5484240" cy="3598560"/>
+            <a:ext cx="5483880" cy="3598200"/>
           </a:xfrm>
           <a:prstGeom prst="rect">
             <a:avLst/>
@@ -2836,7 +2836,7 @@
         <p:spPr>
           <a:xfrm>
             <a:off x="3884760" y="8685360"/>
-            <a:ext cx="2969640" cy="456480"/>
+            <a:ext cx="2969280" cy="456120"/>
           </a:xfrm>
           <a:prstGeom prst="rect">
             <a:avLst/>
@@ -2877,7 +2877,7 @@
                 <a:tab algn="l" pos="0"/>
               </a:tabLst>
             </a:pPr>
-            <a:fld id="{7C8CF991-0AF2-4043-A3FA-C4BA1F35DAA3}" type="slidenum">
+            <a:fld id="{DB384DB7-B726-4488-8D6A-C310DDA2B7DA}" type="slidenum">
               <a:rPr b="0" lang="es-CO" sz="1400" spc="-1" strike="noStrike">
                 <a:solidFill>
                   <a:srgbClr val="000000"/>
@@ -2951,7 +2951,7 @@
         <p:txBody>
           <a:bodyPr/>
           <a:p>
-            <a:fld id="{4599B679-97FF-46E2-986D-212D25779D3F}" type="slidenum">
+            <a:fld id="{E830F4BF-A388-43DC-AE4B-98970CF96743}" type="slidenum">
               <a:t>&lt;#&gt;</a:t>
             </a:fld>
           </a:p>
@@ -3034,7 +3034,7 @@
         <p:txBody>
           <a:bodyPr/>
           <a:p>
-            <a:fld id="{7980726D-9EF0-40BD-8C7A-73AE772768B3}" type="slidenum">
+            <a:fld id="{F0269383-21AE-495C-809B-878556320C27}" type="slidenum">
               <a:t>&lt;#&gt;</a:t>
             </a:fld>
           </a:p>
@@ -3117,7 +3117,7 @@
         <p:txBody>
           <a:bodyPr/>
           <a:p>
-            <a:fld id="{B57B3EAC-6ED0-4A76-9C23-B422BEC1F441}" type="slidenum">
+            <a:fld id="{F2719D7D-2C1C-40D7-A75C-234F96A407D7}" type="slidenum">
               <a:t>&lt;#&gt;</a:t>
             </a:fld>
           </a:p>
@@ -3200,7 +3200,7 @@
         <p:txBody>
           <a:bodyPr/>
           <a:p>
-            <a:fld id="{DEF34684-5D67-4FA6-8419-BFCF814FBEC5}" type="slidenum">
+            <a:fld id="{93731CCD-F49C-431C-AFEE-C820C5D9B047}" type="slidenum">
               <a:t>&lt;#&gt;</a:t>
             </a:fld>
           </a:p>
@@ -3283,7 +3283,7 @@
         <p:txBody>
           <a:bodyPr/>
           <a:p>
-            <a:fld id="{BE834E08-716D-47A0-B943-ED573F649808}" type="slidenum">
+            <a:fld id="{6803A979-FEB0-49F7-9C62-6A492218436C}" type="slidenum">
               <a:t>&lt;#&gt;</a:t>
             </a:fld>
           </a:p>
@@ -3446,7 +3446,7 @@
         <p:txBody>
           <a:bodyPr/>
           <a:p>
-            <a:fld id="{E76321C4-ACD4-4A39-A2F7-B408AA35BBFA}" type="slidenum">
+            <a:fld id="{C804B283-8F9B-438C-A708-93DCCF8754A4}" type="slidenum">
               <a:t>&lt;#&gt;</a:t>
             </a:fld>
           </a:p>
@@ -3612,7 +3612,7 @@
         <p:txBody>
           <a:bodyPr/>
           <a:p>
-            <a:fld id="{3A5037DD-32C4-4BA0-BDBB-9247C5A1A5BE}" type="slidenum">
+            <a:fld id="{96F69BA9-BBBE-45FB-A9FD-1A3F7DD40A31}" type="slidenum">
               <a:t>&lt;#&gt;</a:t>
             </a:fld>
           </a:p>
@@ -3695,7 +3695,7 @@
         <p:txBody>
           <a:bodyPr/>
           <a:p>
-            <a:fld id="{440E4F8D-9F80-4226-ABBD-205953E2CB48}" type="slidenum">
+            <a:fld id="{E0808F96-31CA-40E2-8057-87F9BE542390}" type="slidenum">
               <a:t>&lt;#&gt;</a:t>
             </a:fld>
           </a:p>
@@ -3904,7 +3904,7 @@
         <p:txBody>
           <a:bodyPr/>
           <a:p>
-            <a:fld id="{8FA1A44D-532D-4893-9BB8-CC03FBD6B92F}" type="slidenum">
+            <a:fld id="{CD54E74F-4FA8-43B1-9D6D-55D7582BD465}" type="slidenum">
               <a:t>&lt;#&gt;</a:t>
             </a:fld>
           </a:p>
@@ -3987,7 +3987,7 @@
         <p:txBody>
           <a:bodyPr/>
           <a:p>
-            <a:fld id="{90BEFBFA-1D7C-4E2E-B18D-73A536B6EAE8}" type="slidenum">
+            <a:fld id="{A631BF3E-62DA-457F-B86D-B203CED20733}" type="slidenum">
               <a:t>&lt;#&gt;</a:t>
             </a:fld>
           </a:p>
@@ -4110,7 +4110,7 @@
         <p:txBody>
           <a:bodyPr/>
           <a:p>
-            <a:fld id="{40A89A56-EB8B-4E72-9937-9B5223186EBB}" type="slidenum">
+            <a:fld id="{ED6E76D5-5D43-44B9-82CF-370554C3B2EC}" type="slidenum">
               <a:t>&lt;#&gt;</a:t>
             </a:fld>
           </a:p>
@@ -4179,7 +4179,7 @@
         <p:spPr>
           <a:xfrm>
             <a:off x="4038480" y="6356520"/>
-            <a:ext cx="4112640" cy="362880"/>
+            <a:ext cx="4112280" cy="362520"/>
           </a:xfrm>
           <a:prstGeom prst="rect">
             <a:avLst/>
@@ -4251,7 +4251,7 @@
         <p:spPr>
           <a:xfrm>
             <a:off x="8610480" y="6356520"/>
-            <a:ext cx="2741040" cy="362880"/>
+            <a:ext cx="2740680" cy="362520"/>
           </a:xfrm>
           <a:prstGeom prst="rect">
             <a:avLst/>
@@ -4293,7 +4293,7 @@
                 <a:tab algn="l" pos="0"/>
               </a:tabLst>
             </a:pPr>
-            <a:fld id="{B7509662-6381-4A0F-B0F8-45D52AB9646C}" type="slidenum">
+            <a:fld id="{D3F53D08-8F66-4D40-99B7-165D35CE058B}" type="slidenum">
               <a:rPr b="0" lang="es-CO" sz="1200" spc="-1" strike="noStrike">
                 <a:solidFill>
                   <a:srgbClr val="888888"/>
@@ -4325,7 +4325,7 @@
         <p:spPr>
           <a:xfrm>
             <a:off x="838080" y="6356520"/>
-            <a:ext cx="2741040" cy="362880"/>
+            <a:ext cx="2740680" cy="362520"/>
           </a:xfrm>
           <a:prstGeom prst="rect">
             <a:avLst/>
@@ -4692,7 +4692,7 @@
         <p:spPr>
           <a:xfrm>
             <a:off x="4038480" y="6356520"/>
-            <a:ext cx="4112640" cy="362880"/>
+            <a:ext cx="4112280" cy="362520"/>
           </a:xfrm>
           <a:prstGeom prst="rect">
             <a:avLst/>
@@ -4764,7 +4764,7 @@
         <p:spPr>
           <a:xfrm>
             <a:off x="8610480" y="6356520"/>
-            <a:ext cx="2741040" cy="362880"/>
+            <a:ext cx="2740680" cy="362520"/>
           </a:xfrm>
           <a:prstGeom prst="rect">
             <a:avLst/>
@@ -4806,7 +4806,7 @@
                 <a:tab algn="l" pos="0"/>
               </a:tabLst>
             </a:pPr>
-            <a:fld id="{EEED7A42-12E4-4F5F-A2AE-634CF3B6F210}" type="slidenum">
+            <a:fld id="{DD5FB44B-9C78-48DA-8812-C3C7DEFC9155}" type="slidenum">
               <a:rPr b="0" lang="es-CO" sz="1200" spc="-1" strike="noStrike">
                 <a:solidFill>
                   <a:srgbClr val="888888"/>
@@ -4838,7 +4838,7 @@
         <p:spPr>
           <a:xfrm>
             <a:off x="838080" y="6356520"/>
-            <a:ext cx="2741040" cy="362880"/>
+            <a:ext cx="2740680" cy="362520"/>
           </a:xfrm>
           <a:prstGeom prst="rect">
             <a:avLst/>
@@ -4931,7 +4931,7 @@
         <p:spPr>
           <a:xfrm>
             <a:off x="4038480" y="6356520"/>
-            <a:ext cx="4112640" cy="362880"/>
+            <a:ext cx="4112280" cy="362520"/>
           </a:xfrm>
           <a:prstGeom prst="rect">
             <a:avLst/>
@@ -5003,7 +5003,7 @@
         <p:spPr>
           <a:xfrm>
             <a:off x="8610480" y="6356520"/>
-            <a:ext cx="2741040" cy="362880"/>
+            <a:ext cx="2740680" cy="362520"/>
           </a:xfrm>
           <a:prstGeom prst="rect">
             <a:avLst/>
@@ -5045,7 +5045,7 @@
                 <a:tab algn="l" pos="0"/>
               </a:tabLst>
             </a:pPr>
-            <a:fld id="{EE4183D0-1CA9-4F7A-B183-EE4086B0D1D3}" type="slidenum">
+            <a:fld id="{67ED6C97-7C06-448C-928B-2870AA469F12}" type="slidenum">
               <a:rPr b="0" lang="es-CO" sz="1200" spc="-1" strike="noStrike">
                 <a:solidFill>
                   <a:srgbClr val="888888"/>
@@ -5077,7 +5077,7 @@
         <p:spPr>
           <a:xfrm>
             <a:off x="838080" y="6356520"/>
-            <a:ext cx="2741040" cy="362880"/>
+            <a:ext cx="2740680" cy="362520"/>
           </a:xfrm>
           <a:prstGeom prst="rect">
             <a:avLst/>
@@ -5170,7 +5170,7 @@
         <p:spPr>
           <a:xfrm>
             <a:off x="4038480" y="6356520"/>
-            <a:ext cx="4112640" cy="362880"/>
+            <a:ext cx="4112280" cy="362520"/>
           </a:xfrm>
           <a:prstGeom prst="rect">
             <a:avLst/>
@@ -5242,7 +5242,7 @@
         <p:spPr>
           <a:xfrm>
             <a:off x="8610480" y="6356520"/>
-            <a:ext cx="2741040" cy="362880"/>
+            <a:ext cx="2740680" cy="362520"/>
           </a:xfrm>
           <a:prstGeom prst="rect">
             <a:avLst/>
@@ -5284,7 +5284,7 @@
                 <a:tab algn="l" pos="0"/>
               </a:tabLst>
             </a:pPr>
-            <a:fld id="{253FC5DB-D42A-4AE7-84B4-3472795DD9FD}" type="slidenum">
+            <a:fld id="{9B14CA08-5FA6-4077-AFBF-74B8EB62B89F}" type="slidenum">
               <a:rPr b="0" lang="es-CO" sz="1200" spc="-1" strike="noStrike">
                 <a:solidFill>
                   <a:srgbClr val="888888"/>
@@ -5316,7 +5316,7 @@
         <p:spPr>
           <a:xfrm>
             <a:off x="838080" y="6356520"/>
-            <a:ext cx="2741040" cy="362880"/>
+            <a:ext cx="2740680" cy="362520"/>
           </a:xfrm>
           <a:prstGeom prst="rect">
             <a:avLst/>
@@ -5409,7 +5409,7 @@
         <p:spPr>
           <a:xfrm>
             <a:off x="4038480" y="6356520"/>
-            <a:ext cx="4112640" cy="362880"/>
+            <a:ext cx="4112280" cy="362520"/>
           </a:xfrm>
           <a:prstGeom prst="rect">
             <a:avLst/>
@@ -5481,7 +5481,7 @@
         <p:spPr>
           <a:xfrm>
             <a:off x="8610480" y="6356520"/>
-            <a:ext cx="2741040" cy="362880"/>
+            <a:ext cx="2740680" cy="362520"/>
           </a:xfrm>
           <a:prstGeom prst="rect">
             <a:avLst/>
@@ -5523,7 +5523,7 @@
                 <a:tab algn="l" pos="0"/>
               </a:tabLst>
             </a:pPr>
-            <a:fld id="{A2D41F39-E83A-43C0-8CA9-224E9C873A8C}" type="slidenum">
+            <a:fld id="{749A4EE0-742A-4604-90D9-2F3AF19B8A2B}" type="slidenum">
               <a:rPr b="0" lang="es-CO" sz="1200" spc="-1" strike="noStrike">
                 <a:solidFill>
                   <a:srgbClr val="888888"/>
@@ -5555,7 +5555,7 @@
         <p:spPr>
           <a:xfrm>
             <a:off x="838080" y="6356520"/>
-            <a:ext cx="2741040" cy="362880"/>
+            <a:ext cx="2740680" cy="362520"/>
           </a:xfrm>
           <a:prstGeom prst="rect">
             <a:avLst/>
@@ -5697,7 +5697,7 @@
         <p:spPr>
           <a:xfrm>
             <a:off x="4038480" y="6356520"/>
-            <a:ext cx="4112640" cy="362880"/>
+            <a:ext cx="4112280" cy="362520"/>
           </a:xfrm>
           <a:prstGeom prst="rect">
             <a:avLst/>
@@ -5769,7 +5769,7 @@
         <p:spPr>
           <a:xfrm>
             <a:off x="8610480" y="6356520"/>
-            <a:ext cx="2741040" cy="362880"/>
+            <a:ext cx="2740680" cy="362520"/>
           </a:xfrm>
           <a:prstGeom prst="rect">
             <a:avLst/>
@@ -5811,7 +5811,7 @@
                 <a:tab algn="l" pos="0"/>
               </a:tabLst>
             </a:pPr>
-            <a:fld id="{F3DDE307-1519-4BDD-89B2-3ABC68CE68D6}" type="slidenum">
+            <a:fld id="{28033D41-17F5-46EC-9427-6BCC0A462D6A}" type="slidenum">
               <a:rPr b="0" lang="es-CO" sz="1200" spc="-1" strike="noStrike">
                 <a:solidFill>
                   <a:srgbClr val="888888"/>
@@ -5843,7 +5843,7 @@
         <p:spPr>
           <a:xfrm>
             <a:off x="838080" y="6356520"/>
-            <a:ext cx="2741040" cy="362880"/>
+            <a:ext cx="2740680" cy="362520"/>
           </a:xfrm>
           <a:prstGeom prst="rect">
             <a:avLst/>
@@ -6210,7 +6210,7 @@
         <p:spPr>
           <a:xfrm>
             <a:off x="4038480" y="6356520"/>
-            <a:ext cx="4112640" cy="362880"/>
+            <a:ext cx="4112280" cy="362520"/>
           </a:xfrm>
           <a:prstGeom prst="rect">
             <a:avLst/>
@@ -6282,7 +6282,7 @@
         <p:spPr>
           <a:xfrm>
             <a:off x="8610480" y="6356520"/>
-            <a:ext cx="2741040" cy="362880"/>
+            <a:ext cx="2740680" cy="362520"/>
           </a:xfrm>
           <a:prstGeom prst="rect">
             <a:avLst/>
@@ -6324,7 +6324,7 @@
                 <a:tab algn="l" pos="0"/>
               </a:tabLst>
             </a:pPr>
-            <a:fld id="{312E45B5-0244-4A7F-A628-21C905AB0DB7}" type="slidenum">
+            <a:fld id="{08ADF430-3B88-4244-9437-FD50ED81491A}" type="slidenum">
               <a:rPr b="0" lang="es-CO" sz="1200" spc="-1" strike="noStrike">
                 <a:solidFill>
                   <a:srgbClr val="888888"/>
@@ -6356,7 +6356,7 @@
         <p:spPr>
           <a:xfrm>
             <a:off x="838080" y="6356520"/>
-            <a:ext cx="2741040" cy="362880"/>
+            <a:ext cx="2740680" cy="362520"/>
           </a:xfrm>
           <a:prstGeom prst="rect">
             <a:avLst/>
@@ -6449,7 +6449,7 @@
         <p:spPr>
           <a:xfrm>
             <a:off x="4038480" y="6356520"/>
-            <a:ext cx="4112640" cy="362880"/>
+            <a:ext cx="4112280" cy="362520"/>
           </a:xfrm>
           <a:prstGeom prst="rect">
             <a:avLst/>
@@ -6521,7 +6521,7 @@
         <p:spPr>
           <a:xfrm>
             <a:off x="8610480" y="6356520"/>
-            <a:ext cx="2741040" cy="362880"/>
+            <a:ext cx="2740680" cy="362520"/>
           </a:xfrm>
           <a:prstGeom prst="rect">
             <a:avLst/>
@@ -6563,7 +6563,7 @@
                 <a:tab algn="l" pos="0"/>
               </a:tabLst>
             </a:pPr>
-            <a:fld id="{50ED98E5-AC93-49A9-A63A-C3A12097C0D0}" type="slidenum">
+            <a:fld id="{88C45FC7-2E74-48ED-A9AF-60C24C99EF41}" type="slidenum">
               <a:rPr b="0" lang="es-CO" sz="1200" spc="-1" strike="noStrike">
                 <a:solidFill>
                   <a:srgbClr val="888888"/>
@@ -6595,7 +6595,7 @@
         <p:spPr>
           <a:xfrm>
             <a:off x="838080" y="6356520"/>
-            <a:ext cx="2741040" cy="362880"/>
+            <a:ext cx="2740680" cy="362520"/>
           </a:xfrm>
           <a:prstGeom prst="rect">
             <a:avLst/>
@@ -7187,7 +7187,7 @@
         <p:spPr>
           <a:xfrm>
             <a:off x="4038480" y="6356520"/>
-            <a:ext cx="4112640" cy="362880"/>
+            <a:ext cx="4112280" cy="362520"/>
           </a:xfrm>
           <a:prstGeom prst="rect">
             <a:avLst/>
@@ -7259,7 +7259,7 @@
         <p:spPr>
           <a:xfrm>
             <a:off x="8610480" y="6356520"/>
-            <a:ext cx="2741040" cy="362880"/>
+            <a:ext cx="2740680" cy="362520"/>
           </a:xfrm>
           <a:prstGeom prst="rect">
             <a:avLst/>
@@ -7301,7 +7301,7 @@
                 <a:tab algn="l" pos="0"/>
               </a:tabLst>
             </a:pPr>
-            <a:fld id="{B8E10BB6-A556-4D09-BF83-9F694FF11144}" type="slidenum">
+            <a:fld id="{2CA18286-7C77-4283-8E8F-8A3DC9CA68A7}" type="slidenum">
               <a:rPr b="0" lang="es-CO" sz="1200" spc="-1" strike="noStrike">
                 <a:solidFill>
                   <a:srgbClr val="888888"/>
@@ -7333,7 +7333,7 @@
         <p:spPr>
           <a:xfrm>
             <a:off x="838080" y="6356520"/>
-            <a:ext cx="2741040" cy="362880"/>
+            <a:ext cx="2740680" cy="362520"/>
           </a:xfrm>
           <a:prstGeom prst="rect">
             <a:avLst/>
@@ -7426,7 +7426,7 @@
         <p:spPr>
           <a:xfrm>
             <a:off x="4038480" y="6356520"/>
-            <a:ext cx="4112640" cy="362880"/>
+            <a:ext cx="4112280" cy="362520"/>
           </a:xfrm>
           <a:prstGeom prst="rect">
             <a:avLst/>
@@ -7498,7 +7498,7 @@
         <p:spPr>
           <a:xfrm>
             <a:off x="8610480" y="6356520"/>
-            <a:ext cx="2741040" cy="362880"/>
+            <a:ext cx="2740680" cy="362520"/>
           </a:xfrm>
           <a:prstGeom prst="rect">
             <a:avLst/>
@@ -7540,7 +7540,7 @@
                 <a:tab algn="l" pos="0"/>
               </a:tabLst>
             </a:pPr>
-            <a:fld id="{241CE23E-45A7-4242-AF32-1881A75E8607}" type="slidenum">
+            <a:fld id="{76CFE3AB-0671-48A2-921B-2CF552E4E8A7}" type="slidenum">
               <a:rPr b="0" lang="es-CO" sz="1200" spc="-1" strike="noStrike">
                 <a:solidFill>
                   <a:srgbClr val="888888"/>
@@ -7572,7 +7572,7 @@
         <p:spPr>
           <a:xfrm>
             <a:off x="838080" y="6356520"/>
-            <a:ext cx="2741040" cy="362880"/>
+            <a:ext cx="2740680" cy="362520"/>
           </a:xfrm>
           <a:prstGeom prst="rect">
             <a:avLst/>
@@ -7714,7 +7714,7 @@
         <p:spPr>
           <a:xfrm>
             <a:off x="4038480" y="6356520"/>
-            <a:ext cx="4112640" cy="362880"/>
+            <a:ext cx="4112280" cy="362520"/>
           </a:xfrm>
           <a:prstGeom prst="rect">
             <a:avLst/>
@@ -7786,7 +7786,7 @@
         <p:spPr>
           <a:xfrm>
             <a:off x="8610480" y="6356520"/>
-            <a:ext cx="2741040" cy="362880"/>
+            <a:ext cx="2740680" cy="362520"/>
           </a:xfrm>
           <a:prstGeom prst="rect">
             <a:avLst/>
@@ -7828,7 +7828,7 @@
                 <a:tab algn="l" pos="0"/>
               </a:tabLst>
             </a:pPr>
-            <a:fld id="{B1DBD8FE-B715-456B-B855-48D60A4A7800}" type="slidenum">
+            <a:fld id="{7FEC6416-1F73-4C56-912C-4936585DD75D}" type="slidenum">
               <a:rPr b="0" lang="es-CO" sz="1200" spc="-1" strike="noStrike">
                 <a:solidFill>
                   <a:srgbClr val="888888"/>
@@ -7860,7 +7860,7 @@
         <p:spPr>
           <a:xfrm>
             <a:off x="838080" y="6356520"/>
-            <a:ext cx="2741040" cy="362880"/>
+            <a:ext cx="2740680" cy="362520"/>
           </a:xfrm>
           <a:prstGeom prst="rect">
             <a:avLst/>
@@ -7942,9 +7942,9 @@
         <p:grpSpPr>
           <a:xfrm>
             <a:off x="0" y="0"/>
-            <a:ext cx="12189960" cy="6855840"/>
+            <a:ext cx="12189600" cy="6855480"/>
             <a:chOff x="0" y="0"/>
-            <a:chExt cx="12189960" cy="6855840"/>
+            <a:chExt cx="12189600" cy="6855480"/>
           </a:xfrm>
         </p:grpSpPr>
         <p:pic>
@@ -7961,7 +7961,7 @@
           <p:spPr>
             <a:xfrm>
               <a:off x="0" y="0"/>
-              <a:ext cx="12189960" cy="6855840"/>
+              <a:ext cx="12189600" cy="6855480"/>
             </a:xfrm>
             <a:prstGeom prst="rect">
               <a:avLst/>
@@ -7984,7 +7984,7 @@
           <p:spPr>
             <a:xfrm>
               <a:off x="0" y="0"/>
-              <a:ext cx="12189960" cy="6855840"/>
+              <a:ext cx="12189600" cy="6855480"/>
             </a:xfrm>
             <a:prstGeom prst="rect">
               <a:avLst/>
@@ -8008,7 +8008,7 @@
         <p:spPr>
           <a:xfrm>
             <a:off x="4219200" y="647640"/>
-            <a:ext cx="3751920" cy="1796760"/>
+            <a:ext cx="3751560" cy="1796400"/>
           </a:xfrm>
           <a:prstGeom prst="rect">
             <a:avLst/>
@@ -8027,7 +8027,7 @@
         <p:spPr>
           <a:xfrm>
             <a:off x="2158560" y="2392560"/>
-            <a:ext cx="7872480" cy="1156320"/>
+            <a:ext cx="7872120" cy="1156320"/>
           </a:xfrm>
           <a:prstGeom prst="rect">
             <a:avLst/>
@@ -8084,7 +8084,7 @@
         <p:spPr>
           <a:xfrm>
             <a:off x="2185200" y="3582000"/>
-            <a:ext cx="7872480" cy="699120"/>
+            <a:ext cx="7872120" cy="699120"/>
           </a:xfrm>
           <a:prstGeom prst="rect">
             <a:avLst/>
@@ -8155,7 +8155,7 @@
         <p:spPr>
           <a:xfrm>
             <a:off x="9712800" y="5933520"/>
-            <a:ext cx="2162880" cy="667440"/>
+            <a:ext cx="2162520" cy="667080"/>
           </a:xfrm>
           <a:prstGeom prst="rect">
             <a:avLst/>
@@ -8174,9 +8174,9 @@
         <p:grpSpPr>
           <a:xfrm>
             <a:off x="626400" y="254520"/>
-            <a:ext cx="11249280" cy="981000"/>
+            <a:ext cx="11248920" cy="980640"/>
             <a:chOff x="626400" y="254520"/>
-            <a:chExt cx="11249280" cy="981000"/>
+            <a:chExt cx="11248920" cy="980640"/>
           </a:xfrm>
         </p:grpSpPr>
         <p:pic>
@@ -8192,7 +8192,7 @@
           <p:spPr>
             <a:xfrm>
               <a:off x="10059840" y="254520"/>
-              <a:ext cx="1815840" cy="981000"/>
+              <a:ext cx="1815480" cy="980640"/>
             </a:xfrm>
             <a:prstGeom prst="rect">
               <a:avLst/>
@@ -8215,7 +8215,7 @@
           <p:spPr>
             <a:xfrm>
               <a:off x="626400" y="484200"/>
-              <a:ext cx="1503720" cy="522360"/>
+              <a:ext cx="1503360" cy="522000"/>
             </a:xfrm>
             <a:prstGeom prst="rect">
               <a:avLst/>
@@ -8235,7 +8235,7 @@
         <p:spPr>
           <a:xfrm>
             <a:off x="4545360" y="4447800"/>
-            <a:ext cx="2817720" cy="921240"/>
+            <a:ext cx="2817360" cy="920880"/>
           </a:xfrm>
           <a:prstGeom prst="rect">
             <a:avLst/>
@@ -8374,9 +8374,9 @@
         <p:grpSpPr>
           <a:xfrm>
             <a:off x="360" y="-17640"/>
-            <a:ext cx="12189960" cy="6855840"/>
+            <a:ext cx="12189600" cy="6855480"/>
             <a:chOff x="360" y="-17640"/>
-            <a:chExt cx="12189960" cy="6855840"/>
+            <a:chExt cx="12189600" cy="6855480"/>
           </a:xfrm>
         </p:grpSpPr>
         <p:pic>
@@ -8393,7 +8393,7 @@
           <p:spPr>
             <a:xfrm>
               <a:off x="360" y="-17640"/>
-              <a:ext cx="12189960" cy="6855840"/>
+              <a:ext cx="12189600" cy="6855480"/>
             </a:xfrm>
             <a:prstGeom prst="rect">
               <a:avLst/>
@@ -8416,7 +8416,7 @@
           <p:spPr>
             <a:xfrm>
               <a:off x="360" y="-17640"/>
-              <a:ext cx="12189960" cy="6855840"/>
+              <a:ext cx="12189600" cy="6855480"/>
             </a:xfrm>
             <a:prstGeom prst="rect">
               <a:avLst/>
@@ -8440,7 +8440,7 @@
         <p:spPr>
           <a:xfrm>
             <a:off x="4815360" y="165600"/>
-            <a:ext cx="2337120" cy="1118520"/>
+            <a:ext cx="2336760" cy="1118160"/>
           </a:xfrm>
           <a:prstGeom prst="rect">
             <a:avLst/>
@@ -8459,9 +8459,9 @@
         <p:grpSpPr>
           <a:xfrm>
             <a:off x="626400" y="254520"/>
-            <a:ext cx="11249280" cy="981000"/>
+            <a:ext cx="11248920" cy="980640"/>
             <a:chOff x="626400" y="254520"/>
-            <a:chExt cx="11249280" cy="981000"/>
+            <a:chExt cx="11248920" cy="980640"/>
           </a:xfrm>
         </p:grpSpPr>
         <p:pic>
@@ -8477,7 +8477,7 @@
           <p:spPr>
             <a:xfrm>
               <a:off x="10059840" y="254520"/>
-              <a:ext cx="1815840" cy="981000"/>
+              <a:ext cx="1815480" cy="980640"/>
             </a:xfrm>
             <a:prstGeom prst="rect">
               <a:avLst/>
@@ -8500,7 +8500,7 @@
           <p:spPr>
             <a:xfrm>
               <a:off x="626400" y="484200"/>
-              <a:ext cx="1503720" cy="522360"/>
+              <a:ext cx="1503360" cy="522000"/>
             </a:xfrm>
             <a:prstGeom prst="rect">
               <a:avLst/>
@@ -8520,7 +8520,7 @@
         <p:spPr>
           <a:xfrm>
             <a:off x="1440720" y="900000"/>
-            <a:ext cx="9358920" cy="638280"/>
+            <a:ext cx="9358560" cy="638280"/>
           </a:xfrm>
           <a:prstGeom prst="rect">
             <a:avLst/>
@@ -8583,7 +8583,7 @@
         <p:spPr>
           <a:xfrm>
             <a:off x="1271880" y="1232280"/>
-            <a:ext cx="3947040" cy="485640"/>
+            <a:ext cx="3946680" cy="485280"/>
           </a:xfrm>
           <a:prstGeom prst="rect">
             <a:avLst/>
@@ -8604,6 +8604,11 @@
             <a:noAutofit/>
           </a:bodyPr>
           <a:p>
+            <a:pPr>
+              <a:lnSpc>
+                <a:spcPct val="100000"/>
+              </a:lnSpc>
+            </a:pPr>
             <a:endParaRPr b="0" lang="es-CO" sz="1800" spc="-1" strike="noStrike">
               <a:solidFill>
                 <a:srgbClr val="000000"/>
@@ -8626,7 +8631,7 @@
         <p:spPr>
           <a:xfrm>
             <a:off x="3060000" y="1908360"/>
-            <a:ext cx="6095520" cy="4571640"/>
+            <a:ext cx="6095160" cy="4571280"/>
           </a:xfrm>
           <a:prstGeom prst="rect">
             <a:avLst/>
@@ -8675,9 +8680,9 @@
         <p:grpSpPr>
           <a:xfrm>
             <a:off x="360" y="-17640"/>
-            <a:ext cx="12189960" cy="6855840"/>
+            <a:ext cx="12189600" cy="6855480"/>
             <a:chOff x="360" y="-17640"/>
-            <a:chExt cx="12189960" cy="6855840"/>
+            <a:chExt cx="12189600" cy="6855480"/>
           </a:xfrm>
         </p:grpSpPr>
         <p:pic>
@@ -8694,7 +8699,7 @@
           <p:spPr>
             <a:xfrm>
               <a:off x="360" y="-17640"/>
-              <a:ext cx="12189960" cy="6855840"/>
+              <a:ext cx="12189600" cy="6855480"/>
             </a:xfrm>
             <a:prstGeom prst="rect">
               <a:avLst/>
@@ -8717,7 +8722,7 @@
           <p:spPr>
             <a:xfrm>
               <a:off x="360" y="-17640"/>
-              <a:ext cx="12189960" cy="6855840"/>
+              <a:ext cx="12189600" cy="6855480"/>
             </a:xfrm>
             <a:prstGeom prst="rect">
               <a:avLst/>
@@ -8741,7 +8746,7 @@
         <p:spPr>
           <a:xfrm>
             <a:off x="4815360" y="165600"/>
-            <a:ext cx="2337120" cy="1118520"/>
+            <a:ext cx="2336760" cy="1118160"/>
           </a:xfrm>
           <a:prstGeom prst="rect">
             <a:avLst/>
@@ -8760,9 +8765,9 @@
         <p:grpSpPr>
           <a:xfrm>
             <a:off x="626400" y="254520"/>
-            <a:ext cx="11249280" cy="981000"/>
+            <a:ext cx="11248920" cy="980640"/>
             <a:chOff x="626400" y="254520"/>
-            <a:chExt cx="11249280" cy="981000"/>
+            <a:chExt cx="11248920" cy="980640"/>
           </a:xfrm>
         </p:grpSpPr>
         <p:pic>
@@ -8778,7 +8783,7 @@
           <p:spPr>
             <a:xfrm>
               <a:off x="10059840" y="254520"/>
-              <a:ext cx="1815840" cy="981000"/>
+              <a:ext cx="1815480" cy="980640"/>
             </a:xfrm>
             <a:prstGeom prst="rect">
               <a:avLst/>
@@ -8801,7 +8806,7 @@
           <p:spPr>
             <a:xfrm>
               <a:off x="626400" y="484200"/>
-              <a:ext cx="1503720" cy="522360"/>
+              <a:ext cx="1503360" cy="522000"/>
             </a:xfrm>
             <a:prstGeom prst="rect">
               <a:avLst/>
@@ -8821,7 +8826,7 @@
         <p:spPr>
           <a:xfrm>
             <a:off x="1440720" y="900000"/>
-            <a:ext cx="9358920" cy="638280"/>
+            <a:ext cx="9358560" cy="638280"/>
           </a:xfrm>
           <a:prstGeom prst="rect">
             <a:avLst/>
@@ -8884,7 +8889,7 @@
         <p:spPr>
           <a:xfrm>
             <a:off x="1271880" y="1232280"/>
-            <a:ext cx="3947040" cy="485640"/>
+            <a:ext cx="3946680" cy="485280"/>
           </a:xfrm>
           <a:prstGeom prst="rect">
             <a:avLst/>
@@ -8905,6 +8910,11 @@
             <a:noAutofit/>
           </a:bodyPr>
           <a:p>
+            <a:pPr>
+              <a:lnSpc>
+                <a:spcPct val="100000"/>
+              </a:lnSpc>
+            </a:pPr>
             <a:endParaRPr b="0" lang="es-CO" sz="1800" spc="-1" strike="noStrike">
               <a:solidFill>
                 <a:srgbClr val="000000"/>
@@ -8927,7 +8937,7 @@
         <p:spPr>
           <a:xfrm>
             <a:off x="2520000" y="2322000"/>
-            <a:ext cx="6962400" cy="3438000"/>
+            <a:ext cx="6962040" cy="3437640"/>
           </a:xfrm>
           <a:prstGeom prst="rect">
             <a:avLst/>
@@ -8976,9 +8986,9 @@
         <p:grpSpPr>
           <a:xfrm>
             <a:off x="360" y="-17640"/>
-            <a:ext cx="12189960" cy="6855840"/>
+            <a:ext cx="12189600" cy="6855480"/>
             <a:chOff x="360" y="-17640"/>
-            <a:chExt cx="12189960" cy="6855840"/>
+            <a:chExt cx="12189600" cy="6855480"/>
           </a:xfrm>
         </p:grpSpPr>
         <p:pic>
@@ -8995,7 +9005,7 @@
           <p:spPr>
             <a:xfrm>
               <a:off x="360" y="-17640"/>
-              <a:ext cx="12189960" cy="6855840"/>
+              <a:ext cx="12189600" cy="6855480"/>
             </a:xfrm>
             <a:prstGeom prst="rect">
               <a:avLst/>
@@ -9018,7 +9028,7 @@
           <p:spPr>
             <a:xfrm>
               <a:off x="360" y="-17640"/>
-              <a:ext cx="12189960" cy="6855840"/>
+              <a:ext cx="12189600" cy="6855480"/>
             </a:xfrm>
             <a:prstGeom prst="rect">
               <a:avLst/>
@@ -9042,7 +9052,7 @@
         <p:spPr>
           <a:xfrm>
             <a:off x="4815360" y="165600"/>
-            <a:ext cx="2337120" cy="1118520"/>
+            <a:ext cx="2336760" cy="1118160"/>
           </a:xfrm>
           <a:prstGeom prst="rect">
             <a:avLst/>
@@ -9061,9 +9071,9 @@
         <p:grpSpPr>
           <a:xfrm>
             <a:off x="626400" y="254520"/>
-            <a:ext cx="11249280" cy="981000"/>
+            <a:ext cx="11248920" cy="980640"/>
             <a:chOff x="626400" y="254520"/>
-            <a:chExt cx="11249280" cy="981000"/>
+            <a:chExt cx="11248920" cy="980640"/>
           </a:xfrm>
         </p:grpSpPr>
         <p:pic>
@@ -9079,7 +9089,7 @@
           <p:spPr>
             <a:xfrm>
               <a:off x="10059840" y="254520"/>
-              <a:ext cx="1815840" cy="981000"/>
+              <a:ext cx="1815480" cy="980640"/>
             </a:xfrm>
             <a:prstGeom prst="rect">
               <a:avLst/>
@@ -9102,7 +9112,7 @@
           <p:spPr>
             <a:xfrm>
               <a:off x="626400" y="484200"/>
-              <a:ext cx="1503720" cy="522360"/>
+              <a:ext cx="1503360" cy="522000"/>
             </a:xfrm>
             <a:prstGeom prst="rect">
               <a:avLst/>
@@ -9122,7 +9132,7 @@
         <p:spPr>
           <a:xfrm>
             <a:off x="1440720" y="900000"/>
-            <a:ext cx="9358920" cy="638280"/>
+            <a:ext cx="9358560" cy="638280"/>
           </a:xfrm>
           <a:prstGeom prst="rect">
             <a:avLst/>
@@ -9185,7 +9195,7 @@
         <p:spPr>
           <a:xfrm>
             <a:off x="1271880" y="1232280"/>
-            <a:ext cx="3947040" cy="485640"/>
+            <a:ext cx="3946680" cy="485280"/>
           </a:xfrm>
           <a:prstGeom prst="rect">
             <a:avLst/>
@@ -9206,6 +9216,11 @@
             <a:noAutofit/>
           </a:bodyPr>
           <a:p>
+            <a:pPr>
+              <a:lnSpc>
+                <a:spcPct val="100000"/>
+              </a:lnSpc>
+            </a:pPr>
             <a:endParaRPr b="0" lang="es-CO" sz="1800" spc="-1" strike="noStrike">
               <a:solidFill>
                 <a:srgbClr val="000000"/>
@@ -9228,7 +9243,7 @@
         <p:spPr>
           <a:xfrm>
             <a:off x="541080" y="2381760"/>
-            <a:ext cx="5578920" cy="2838240"/>
+            <a:ext cx="5578560" cy="2837880"/>
           </a:xfrm>
           <a:prstGeom prst="rect">
             <a:avLst/>
@@ -9251,7 +9266,7 @@
         <p:spPr>
           <a:xfrm>
             <a:off x="6762960" y="2237040"/>
-            <a:ext cx="4753800" cy="3162960"/>
+            <a:ext cx="4753440" cy="3162600"/>
           </a:xfrm>
           <a:prstGeom prst="rect">
             <a:avLst/>
@@ -9300,9 +9315,9 @@
         <p:grpSpPr>
           <a:xfrm>
             <a:off x="360" y="-17640"/>
-            <a:ext cx="12189960" cy="6855840"/>
+            <a:ext cx="12189600" cy="6855480"/>
             <a:chOff x="360" y="-17640"/>
-            <a:chExt cx="12189960" cy="6855840"/>
+            <a:chExt cx="12189600" cy="6855480"/>
           </a:xfrm>
         </p:grpSpPr>
         <p:pic>
@@ -9319,7 +9334,7 @@
           <p:spPr>
             <a:xfrm>
               <a:off x="360" y="-17640"/>
-              <a:ext cx="12189960" cy="6855840"/>
+              <a:ext cx="12189600" cy="6855480"/>
             </a:xfrm>
             <a:prstGeom prst="rect">
               <a:avLst/>
@@ -9342,7 +9357,7 @@
           <p:spPr>
             <a:xfrm>
               <a:off x="360" y="-17640"/>
-              <a:ext cx="12189960" cy="6855840"/>
+              <a:ext cx="12189600" cy="6855480"/>
             </a:xfrm>
             <a:prstGeom prst="rect">
               <a:avLst/>
@@ -9366,7 +9381,7 @@
         <p:spPr>
           <a:xfrm>
             <a:off x="4815360" y="165600"/>
-            <a:ext cx="2337120" cy="1118520"/>
+            <a:ext cx="2336760" cy="1118160"/>
           </a:xfrm>
           <a:prstGeom prst="rect">
             <a:avLst/>
@@ -9385,9 +9400,9 @@
         <p:grpSpPr>
           <a:xfrm>
             <a:off x="626400" y="254520"/>
-            <a:ext cx="11249280" cy="981000"/>
+            <a:ext cx="11248920" cy="980640"/>
             <a:chOff x="626400" y="254520"/>
-            <a:chExt cx="11249280" cy="981000"/>
+            <a:chExt cx="11248920" cy="980640"/>
           </a:xfrm>
         </p:grpSpPr>
         <p:pic>
@@ -9403,7 +9418,7 @@
           <p:spPr>
             <a:xfrm>
               <a:off x="10059840" y="254520"/>
-              <a:ext cx="1815840" cy="981000"/>
+              <a:ext cx="1815480" cy="980640"/>
             </a:xfrm>
             <a:prstGeom prst="rect">
               <a:avLst/>
@@ -9426,7 +9441,7 @@
           <p:spPr>
             <a:xfrm>
               <a:off x="626400" y="484200"/>
-              <a:ext cx="1503720" cy="522360"/>
+              <a:ext cx="1503360" cy="522000"/>
             </a:xfrm>
             <a:prstGeom prst="rect">
               <a:avLst/>
@@ -9446,7 +9461,7 @@
         <p:spPr>
           <a:xfrm>
             <a:off x="2880000" y="1161720"/>
-            <a:ext cx="9358920" cy="638280"/>
+            <a:ext cx="9358560" cy="638280"/>
           </a:xfrm>
           <a:prstGeom prst="rect">
             <a:avLst/>
@@ -9467,6 +9482,11 @@
             <a:spAutoFit/>
           </a:bodyPr>
           <a:p>
+            <a:pPr>
+              <a:lnSpc>
+                <a:spcPct val="100000"/>
+              </a:lnSpc>
+            </a:pPr>
             <a:r>
               <a:rPr b="0" lang="es-CO" sz="3600" spc="-1" strike="noStrike">
                 <a:solidFill>
@@ -9495,7 +9515,7 @@
         <p:spPr>
           <a:xfrm>
             <a:off x="1271880" y="1232280"/>
-            <a:ext cx="3947040" cy="485640"/>
+            <a:ext cx="3946680" cy="485280"/>
           </a:xfrm>
           <a:prstGeom prst="rect">
             <a:avLst/>
@@ -9516,6 +9536,11 @@
             <a:noAutofit/>
           </a:bodyPr>
           <a:p>
+            <a:pPr>
+              <a:lnSpc>
+                <a:spcPct val="100000"/>
+              </a:lnSpc>
+            </a:pPr>
             <a:endParaRPr b="0" lang="es-CO" sz="1800" spc="-1" strike="noStrike">
               <a:solidFill>
                 <a:srgbClr val="000000"/>
@@ -9538,7 +9563,7 @@
         <p:spPr>
           <a:xfrm>
             <a:off x="3060000" y="2880000"/>
-            <a:ext cx="5733720" cy="2142720"/>
+            <a:ext cx="5733360" cy="2142360"/>
           </a:xfrm>
           <a:prstGeom prst="rect">
             <a:avLst/>
@@ -9587,9 +9612,9 @@
         <p:grpSpPr>
           <a:xfrm>
             <a:off x="360" y="-17640"/>
-            <a:ext cx="12189960" cy="6855840"/>
+            <a:ext cx="12189600" cy="6855480"/>
             <a:chOff x="360" y="-17640"/>
-            <a:chExt cx="12189960" cy="6855840"/>
+            <a:chExt cx="12189600" cy="6855480"/>
           </a:xfrm>
         </p:grpSpPr>
         <p:pic>
@@ -9606,7 +9631,7 @@
           <p:spPr>
             <a:xfrm>
               <a:off x="360" y="-17640"/>
-              <a:ext cx="12189960" cy="6855840"/>
+              <a:ext cx="12189600" cy="6855480"/>
             </a:xfrm>
             <a:prstGeom prst="rect">
               <a:avLst/>
@@ -9629,7 +9654,7 @@
           <p:spPr>
             <a:xfrm>
               <a:off x="360" y="-17640"/>
-              <a:ext cx="12189960" cy="6855840"/>
+              <a:ext cx="12189600" cy="6855480"/>
             </a:xfrm>
             <a:prstGeom prst="rect">
               <a:avLst/>
@@ -9653,7 +9678,7 @@
         <p:spPr>
           <a:xfrm>
             <a:off x="4815360" y="165600"/>
-            <a:ext cx="2337120" cy="1118520"/>
+            <a:ext cx="2336760" cy="1118160"/>
           </a:xfrm>
           <a:prstGeom prst="rect">
             <a:avLst/>
@@ -9672,9 +9697,9 @@
         <p:grpSpPr>
           <a:xfrm>
             <a:off x="626400" y="254520"/>
-            <a:ext cx="11249280" cy="981000"/>
+            <a:ext cx="11248920" cy="980640"/>
             <a:chOff x="626400" y="254520"/>
-            <a:chExt cx="11249280" cy="981000"/>
+            <a:chExt cx="11248920" cy="980640"/>
           </a:xfrm>
         </p:grpSpPr>
         <p:pic>
@@ -9690,7 +9715,7 @@
           <p:spPr>
             <a:xfrm>
               <a:off x="10059840" y="254520"/>
-              <a:ext cx="1815840" cy="981000"/>
+              <a:ext cx="1815480" cy="980640"/>
             </a:xfrm>
             <a:prstGeom prst="rect">
               <a:avLst/>
@@ -9713,7 +9738,7 @@
           <p:spPr>
             <a:xfrm>
               <a:off x="626400" y="484200"/>
-              <a:ext cx="1503720" cy="522360"/>
+              <a:ext cx="1503360" cy="522000"/>
             </a:xfrm>
             <a:prstGeom prst="rect">
               <a:avLst/>
@@ -9733,7 +9758,7 @@
         <p:spPr>
           <a:xfrm>
             <a:off x="2880000" y="1161720"/>
-            <a:ext cx="9358920" cy="638280"/>
+            <a:ext cx="9358560" cy="638280"/>
           </a:xfrm>
           <a:prstGeom prst="rect">
             <a:avLst/>
@@ -9754,6 +9779,11 @@
             <a:spAutoFit/>
           </a:bodyPr>
           <a:p>
+            <a:pPr>
+              <a:lnSpc>
+                <a:spcPct val="100000"/>
+              </a:lnSpc>
+            </a:pPr>
             <a:r>
               <a:rPr b="0" lang="es-CO" sz="3600" spc="-1" strike="noStrike">
                 <a:solidFill>
@@ -9782,7 +9812,7 @@
         <p:spPr>
           <a:xfrm>
             <a:off x="1271880" y="1232280"/>
-            <a:ext cx="3947040" cy="485640"/>
+            <a:ext cx="3946680" cy="485280"/>
           </a:xfrm>
           <a:prstGeom prst="rect">
             <a:avLst/>
@@ -9803,6 +9833,11 @@
             <a:noAutofit/>
           </a:bodyPr>
           <a:p>
+            <a:pPr>
+              <a:lnSpc>
+                <a:spcPct val="100000"/>
+              </a:lnSpc>
+            </a:pPr>
             <a:endParaRPr b="0" lang="es-CO" sz="1800" spc="-1" strike="noStrike">
               <a:solidFill>
                 <a:srgbClr val="000000"/>
@@ -9855,7 +9890,7 @@
         <p:spPr>
           <a:xfrm>
             <a:off x="3965040" y="4641120"/>
-            <a:ext cx="4087800" cy="1335240"/>
+            <a:ext cx="4087440" cy="1334880"/>
           </a:xfrm>
           <a:prstGeom prst="rect">
             <a:avLst/>
@@ -9874,7 +9909,7 @@
         <p:spPr>
           <a:xfrm>
             <a:off x="1228680" y="585000"/>
-            <a:ext cx="9564480" cy="1186920"/>
+            <a:ext cx="9564120" cy="1186920"/>
           </a:xfrm>
           <a:prstGeom prst="rect">
             <a:avLst/>
@@ -9936,7 +9971,7 @@
         <p:spPr>
           <a:xfrm>
             <a:off x="4869360" y="2808000"/>
-            <a:ext cx="2450880" cy="869400"/>
+            <a:ext cx="2450520" cy="869040"/>
           </a:xfrm>
           <a:prstGeom prst="rect">
             <a:avLst/>
@@ -9959,7 +9994,7 @@
         <p:spPr>
           <a:xfrm>
             <a:off x="1228680" y="2808000"/>
-            <a:ext cx="1852920" cy="644400"/>
+            <a:ext cx="1852560" cy="644040"/>
           </a:xfrm>
           <a:prstGeom prst="rect">
             <a:avLst/>
@@ -9982,7 +10017,7 @@
         <p:spPr>
           <a:xfrm>
             <a:off x="8579880" y="2695680"/>
-            <a:ext cx="2025360" cy="1094400"/>
+            <a:ext cx="2025000" cy="1094040"/>
           </a:xfrm>
           <a:prstGeom prst="rect">
             <a:avLst/>
@@ -10005,7 +10040,7 @@
         <p:spPr>
           <a:xfrm>
             <a:off x="597600" y="398520"/>
-            <a:ext cx="1085760" cy="377280"/>
+            <a:ext cx="1085400" cy="376920"/>
           </a:xfrm>
           <a:prstGeom prst="rect">
             <a:avLst/>
@@ -10028,7 +10063,7 @@
         <p:spPr>
           <a:xfrm>
             <a:off x="10002240" y="199800"/>
-            <a:ext cx="1422000" cy="767880"/>
+            <a:ext cx="1421640" cy="767520"/>
           </a:xfrm>
           <a:prstGeom prst="rect">
             <a:avLst/>
@@ -10077,9 +10112,9 @@
         <p:grpSpPr>
           <a:xfrm>
             <a:off x="0" y="0"/>
-            <a:ext cx="12189960" cy="6855840"/>
+            <a:ext cx="12189600" cy="6855480"/>
             <a:chOff x="0" y="0"/>
-            <a:chExt cx="12189960" cy="6855840"/>
+            <a:chExt cx="12189600" cy="6855480"/>
           </a:xfrm>
         </p:grpSpPr>
         <p:pic>
@@ -10096,7 +10131,7 @@
           <p:spPr>
             <a:xfrm>
               <a:off x="0" y="0"/>
-              <a:ext cx="12189960" cy="6855840"/>
+              <a:ext cx="12189600" cy="6855480"/>
             </a:xfrm>
             <a:prstGeom prst="rect">
               <a:avLst/>
@@ -10119,7 +10154,7 @@
           <p:spPr>
             <a:xfrm>
               <a:off x="0" y="0"/>
-              <a:ext cx="12189960" cy="6855840"/>
+              <a:ext cx="12189600" cy="6855480"/>
             </a:xfrm>
             <a:prstGeom prst="rect">
               <a:avLst/>
@@ -10143,7 +10178,7 @@
         <p:spPr>
           <a:xfrm>
             <a:off x="2340720" y="1970640"/>
-            <a:ext cx="7508880" cy="2914200"/>
+            <a:ext cx="7508520" cy="2913840"/>
           </a:xfrm>
           <a:prstGeom prst="rect">
             <a:avLst/>
@@ -10166,7 +10201,7 @@
         <p:spPr>
           <a:xfrm>
             <a:off x="4592160" y="324000"/>
-            <a:ext cx="3005280" cy="1438920"/>
+            <a:ext cx="3004920" cy="1438560"/>
           </a:xfrm>
           <a:prstGeom prst="rect">
             <a:avLst/>
@@ -10189,7 +10224,7 @@
         <p:spPr>
           <a:xfrm>
             <a:off x="9712800" y="5933520"/>
-            <a:ext cx="2162880" cy="667440"/>
+            <a:ext cx="2162520" cy="667080"/>
           </a:xfrm>
           <a:prstGeom prst="rect">
             <a:avLst/>
@@ -10208,9 +10243,9 @@
         <p:grpSpPr>
           <a:xfrm>
             <a:off x="626400" y="254520"/>
-            <a:ext cx="11249280" cy="981000"/>
+            <a:ext cx="11248920" cy="980640"/>
             <a:chOff x="626400" y="254520"/>
-            <a:chExt cx="11249280" cy="981000"/>
+            <a:chExt cx="11248920" cy="980640"/>
           </a:xfrm>
         </p:grpSpPr>
         <p:pic>
@@ -10226,7 +10261,7 @@
           <p:spPr>
             <a:xfrm>
               <a:off x="10059840" y="254520"/>
-              <a:ext cx="1815840" cy="981000"/>
+              <a:ext cx="1815480" cy="980640"/>
             </a:xfrm>
             <a:prstGeom prst="rect">
               <a:avLst/>
@@ -10249,7 +10284,7 @@
           <p:spPr>
             <a:xfrm>
               <a:off x="626400" y="484200"/>
-              <a:ext cx="1503720" cy="522360"/>
+              <a:ext cx="1503360" cy="522000"/>
             </a:xfrm>
             <a:prstGeom prst="rect">
               <a:avLst/>
@@ -10299,9 +10334,9 @@
         <p:grpSpPr>
           <a:xfrm>
             <a:off x="0" y="0"/>
-            <a:ext cx="12189960" cy="6855840"/>
+            <a:ext cx="12189600" cy="6855480"/>
             <a:chOff x="0" y="0"/>
-            <a:chExt cx="12189960" cy="6855840"/>
+            <a:chExt cx="12189600" cy="6855480"/>
           </a:xfrm>
         </p:grpSpPr>
         <p:pic>
@@ -10318,7 +10353,7 @@
           <p:spPr>
             <a:xfrm>
               <a:off x="0" y="0"/>
-              <a:ext cx="12189960" cy="6855840"/>
+              <a:ext cx="12189600" cy="6855480"/>
             </a:xfrm>
             <a:prstGeom prst="rect">
               <a:avLst/>
@@ -10341,7 +10376,7 @@
           <p:spPr>
             <a:xfrm>
               <a:off x="0" y="0"/>
-              <a:ext cx="12189960" cy="6855840"/>
+              <a:ext cx="12189600" cy="6855480"/>
             </a:xfrm>
             <a:prstGeom prst="rect">
               <a:avLst/>
@@ -10365,7 +10400,7 @@
         <p:spPr>
           <a:xfrm>
             <a:off x="4815360" y="165600"/>
-            <a:ext cx="2337120" cy="1118520"/>
+            <a:ext cx="2336760" cy="1118160"/>
           </a:xfrm>
           <a:prstGeom prst="rect">
             <a:avLst/>
@@ -10384,7 +10419,7 @@
         <p:spPr>
           <a:xfrm>
             <a:off x="2753640" y="1352160"/>
-            <a:ext cx="7104960" cy="851760"/>
+            <a:ext cx="7104600" cy="851760"/>
           </a:xfrm>
           <a:prstGeom prst="rect">
             <a:avLst/>
@@ -10441,7 +10476,7 @@
         <p:spPr>
           <a:xfrm>
             <a:off x="3476160" y="2461320"/>
-            <a:ext cx="788040" cy="788040"/>
+            <a:ext cx="787680" cy="787680"/>
           </a:xfrm>
           <a:prstGeom prst="ellipse">
             <a:avLst/>
@@ -10493,7 +10528,7 @@
         <p:spPr>
           <a:xfrm>
             <a:off x="3476160" y="3603960"/>
-            <a:ext cx="788040" cy="788040"/>
+            <a:ext cx="787680" cy="787680"/>
           </a:xfrm>
           <a:prstGeom prst="ellipse">
             <a:avLst/>
@@ -10545,7 +10580,7 @@
         <p:spPr>
           <a:xfrm>
             <a:off x="3476160" y="4757760"/>
-            <a:ext cx="788040" cy="788040"/>
+            <a:ext cx="787680" cy="787680"/>
           </a:xfrm>
           <a:prstGeom prst="ellipse">
             <a:avLst/>
@@ -10597,7 +10632,7 @@
         <p:spPr>
           <a:xfrm>
             <a:off x="4630320" y="2580840"/>
-            <a:ext cx="4188960" cy="658440"/>
+            <a:ext cx="4188600" cy="658080"/>
           </a:xfrm>
           <a:prstGeom prst="roundRect">
             <a:avLst>
@@ -10651,7 +10686,7 @@
         <p:spPr>
           <a:xfrm>
             <a:off x="4630320" y="3668760"/>
-            <a:ext cx="4188960" cy="658440"/>
+            <a:ext cx="4188600" cy="658080"/>
           </a:xfrm>
           <a:prstGeom prst="roundRect">
             <a:avLst>
@@ -10705,7 +10740,7 @@
         <p:spPr>
           <a:xfrm>
             <a:off x="4630320" y="4822560"/>
-            <a:ext cx="4188960" cy="658440"/>
+            <a:ext cx="4188600" cy="658080"/>
           </a:xfrm>
           <a:prstGeom prst="roundRect">
             <a:avLst>
@@ -10759,7 +10794,7 @@
         <p:spPr>
           <a:xfrm>
             <a:off x="3587040" y="2520000"/>
-            <a:ext cx="584640" cy="699120"/>
+            <a:ext cx="584280" cy="699120"/>
           </a:xfrm>
           <a:prstGeom prst="rect">
             <a:avLst/>
@@ -10816,7 +10851,7 @@
         <p:spPr>
           <a:xfrm>
             <a:off x="3594960" y="3687480"/>
-            <a:ext cx="584640" cy="699120"/>
+            <a:ext cx="584280" cy="699120"/>
           </a:xfrm>
           <a:prstGeom prst="rect">
             <a:avLst/>
@@ -10873,7 +10908,7 @@
         <p:spPr>
           <a:xfrm>
             <a:off x="3578040" y="4822560"/>
-            <a:ext cx="584640" cy="699120"/>
+            <a:ext cx="584280" cy="699120"/>
           </a:xfrm>
           <a:prstGeom prst="rect">
             <a:avLst/>
@@ -10930,7 +10965,7 @@
         <p:spPr>
           <a:xfrm>
             <a:off x="4815360" y="2582640"/>
-            <a:ext cx="3792960" cy="699120"/>
+            <a:ext cx="3792600" cy="699120"/>
           </a:xfrm>
           <a:prstGeom prst="rect">
             <a:avLst/>
@@ -10987,7 +11022,7 @@
         <p:spPr>
           <a:xfrm>
             <a:off x="4630320" y="3687480"/>
-            <a:ext cx="4188960" cy="425520"/>
+            <a:ext cx="4188600" cy="424800"/>
           </a:xfrm>
           <a:prstGeom prst="rect">
             <a:avLst/>
@@ -11044,7 +11079,7 @@
         <p:spPr>
           <a:xfrm>
             <a:off x="4630320" y="4844880"/>
-            <a:ext cx="4189680" cy="455760"/>
+            <a:ext cx="4189320" cy="455400"/>
           </a:xfrm>
           <a:prstGeom prst="rect">
             <a:avLst/>
@@ -11109,8 +11144,8 @@
         </p:nvCxnSpPr>
         <p:spPr>
           <a:xfrm>
-            <a:off x="3870360" y="3249360"/>
-            <a:ext cx="360" cy="354960"/>
+            <a:off x="3870000" y="3249000"/>
+            <a:ext cx="360" cy="355320"/>
           </a:xfrm>
           <a:prstGeom prst="straightConnector1">
             <a:avLst/>
@@ -11133,8 +11168,8 @@
         </p:nvCxnSpPr>
         <p:spPr>
           <a:xfrm>
-            <a:off x="3887280" y="4386600"/>
-            <a:ext cx="3240" cy="355680"/>
+            <a:off x="3886920" y="4386600"/>
+            <a:ext cx="3960" cy="356040"/>
           </a:xfrm>
           <a:prstGeom prst="straightConnector1">
             <a:avLst/>
@@ -11156,9 +11191,9 @@
         <p:grpSpPr>
           <a:xfrm>
             <a:off x="626400" y="254520"/>
-            <a:ext cx="11249280" cy="981000"/>
+            <a:ext cx="11248920" cy="980640"/>
             <a:chOff x="626400" y="254520"/>
-            <a:chExt cx="11249280" cy="981000"/>
+            <a:chExt cx="11248920" cy="980640"/>
           </a:xfrm>
         </p:grpSpPr>
         <p:pic>
@@ -11174,7 +11209,7 @@
           <p:spPr>
             <a:xfrm>
               <a:off x="10059840" y="254520"/>
-              <a:ext cx="1815840" cy="981000"/>
+              <a:ext cx="1815480" cy="980640"/>
             </a:xfrm>
             <a:prstGeom prst="rect">
               <a:avLst/>
@@ -11197,7 +11232,7 @@
           <p:spPr>
             <a:xfrm>
               <a:off x="626400" y="484200"/>
-              <a:ext cx="1503720" cy="522360"/>
+              <a:ext cx="1503360" cy="522000"/>
             </a:xfrm>
             <a:prstGeom prst="rect">
               <a:avLst/>
@@ -11247,9 +11282,9 @@
         <p:grpSpPr>
           <a:xfrm>
             <a:off x="360" y="-17640"/>
-            <a:ext cx="12189960" cy="6855840"/>
+            <a:ext cx="12189600" cy="6855480"/>
             <a:chOff x="360" y="-17640"/>
-            <a:chExt cx="12189960" cy="6855840"/>
+            <a:chExt cx="12189600" cy="6855480"/>
           </a:xfrm>
         </p:grpSpPr>
         <p:pic>
@@ -11266,7 +11301,7 @@
           <p:spPr>
             <a:xfrm>
               <a:off x="360" y="-17640"/>
-              <a:ext cx="12189960" cy="6855840"/>
+              <a:ext cx="12189600" cy="6855480"/>
             </a:xfrm>
             <a:prstGeom prst="rect">
               <a:avLst/>
@@ -11289,7 +11324,7 @@
           <p:spPr>
             <a:xfrm>
               <a:off x="360" y="-17640"/>
-              <a:ext cx="12189960" cy="6855840"/>
+              <a:ext cx="12189600" cy="6855480"/>
             </a:xfrm>
             <a:prstGeom prst="rect">
               <a:avLst/>
@@ -11313,7 +11348,7 @@
         <p:spPr>
           <a:xfrm>
             <a:off x="4815360" y="165600"/>
-            <a:ext cx="2337120" cy="1118520"/>
+            <a:ext cx="2336760" cy="1118160"/>
           </a:xfrm>
           <a:prstGeom prst="rect">
             <a:avLst/>
@@ -11332,9 +11367,9 @@
         <p:grpSpPr>
           <a:xfrm>
             <a:off x="626400" y="254520"/>
-            <a:ext cx="11249280" cy="981000"/>
+            <a:ext cx="11248920" cy="980640"/>
             <a:chOff x="626400" y="254520"/>
-            <a:chExt cx="11249280" cy="981000"/>
+            <a:chExt cx="11248920" cy="980640"/>
           </a:xfrm>
         </p:grpSpPr>
         <p:pic>
@@ -11350,7 +11385,7 @@
           <p:spPr>
             <a:xfrm>
               <a:off x="10059840" y="254520"/>
-              <a:ext cx="1815840" cy="981000"/>
+              <a:ext cx="1815480" cy="980640"/>
             </a:xfrm>
             <a:prstGeom prst="rect">
               <a:avLst/>
@@ -11373,7 +11408,7 @@
           <p:spPr>
             <a:xfrm>
               <a:off x="626400" y="484200"/>
-              <a:ext cx="1503720" cy="522360"/>
+              <a:ext cx="1503360" cy="522000"/>
             </a:xfrm>
             <a:prstGeom prst="rect">
               <a:avLst/>
@@ -11393,7 +11428,7 @@
         <p:spPr>
           <a:xfrm>
             <a:off x="1440720" y="900000"/>
-            <a:ext cx="9358920" cy="638280"/>
+            <a:ext cx="9358560" cy="638280"/>
           </a:xfrm>
           <a:prstGeom prst="rect">
             <a:avLst/>
@@ -11456,7 +11491,7 @@
         <p:spPr>
           <a:xfrm>
             <a:off x="1271880" y="1232280"/>
-            <a:ext cx="3947040" cy="485640"/>
+            <a:ext cx="3946680" cy="485280"/>
           </a:xfrm>
           <a:prstGeom prst="rect">
             <a:avLst/>
@@ -11504,7 +11539,7 @@
         <p:spPr>
           <a:xfrm>
             <a:off x="3407040" y="2158920"/>
-            <a:ext cx="5419440" cy="2590560"/>
+            <a:ext cx="5419080" cy="2590200"/>
           </a:xfrm>
           <a:prstGeom prst="rect">
             <a:avLst/>
@@ -11553,9 +11588,9 @@
         <p:grpSpPr>
           <a:xfrm>
             <a:off x="360" y="-17640"/>
-            <a:ext cx="12189960" cy="6855840"/>
+            <a:ext cx="12189600" cy="6855480"/>
             <a:chOff x="360" y="-17640"/>
-            <a:chExt cx="12189960" cy="6855840"/>
+            <a:chExt cx="12189600" cy="6855480"/>
           </a:xfrm>
         </p:grpSpPr>
         <p:pic>
@@ -11572,7 +11607,7 @@
           <p:spPr>
             <a:xfrm>
               <a:off x="360" y="-17640"/>
-              <a:ext cx="12189960" cy="6855840"/>
+              <a:ext cx="12189600" cy="6855480"/>
             </a:xfrm>
             <a:prstGeom prst="rect">
               <a:avLst/>
@@ -11595,7 +11630,7 @@
           <p:spPr>
             <a:xfrm>
               <a:off x="360" y="-17640"/>
-              <a:ext cx="12189960" cy="6855840"/>
+              <a:ext cx="12189600" cy="6855480"/>
             </a:xfrm>
             <a:prstGeom prst="rect">
               <a:avLst/>
@@ -11619,7 +11654,7 @@
         <p:spPr>
           <a:xfrm>
             <a:off x="4815360" y="165600"/>
-            <a:ext cx="2337120" cy="1118520"/>
+            <a:ext cx="2336760" cy="1118160"/>
           </a:xfrm>
           <a:prstGeom prst="rect">
             <a:avLst/>
@@ -11638,9 +11673,9 @@
         <p:grpSpPr>
           <a:xfrm>
             <a:off x="626400" y="254520"/>
-            <a:ext cx="11249280" cy="981000"/>
+            <a:ext cx="11248920" cy="980640"/>
             <a:chOff x="626400" y="254520"/>
-            <a:chExt cx="11249280" cy="981000"/>
+            <a:chExt cx="11248920" cy="980640"/>
           </a:xfrm>
         </p:grpSpPr>
         <p:pic>
@@ -11656,7 +11691,7 @@
           <p:spPr>
             <a:xfrm>
               <a:off x="10059840" y="254520"/>
-              <a:ext cx="1815840" cy="981000"/>
+              <a:ext cx="1815480" cy="980640"/>
             </a:xfrm>
             <a:prstGeom prst="rect">
               <a:avLst/>
@@ -11679,7 +11714,7 @@
           <p:spPr>
             <a:xfrm>
               <a:off x="626400" y="484200"/>
-              <a:ext cx="1503720" cy="522360"/>
+              <a:ext cx="1503360" cy="522000"/>
             </a:xfrm>
             <a:prstGeom prst="rect">
               <a:avLst/>
@@ -11699,7 +11734,7 @@
         <p:spPr>
           <a:xfrm>
             <a:off x="1440720" y="900000"/>
-            <a:ext cx="9358920" cy="638280"/>
+            <a:ext cx="9358560" cy="638280"/>
           </a:xfrm>
           <a:prstGeom prst="rect">
             <a:avLst/>
@@ -11762,7 +11797,7 @@
         <p:spPr>
           <a:xfrm>
             <a:off x="1271880" y="1232280"/>
-            <a:ext cx="3947040" cy="485640"/>
+            <a:ext cx="3946680" cy="485280"/>
           </a:xfrm>
           <a:prstGeom prst="rect">
             <a:avLst/>
@@ -11783,6 +11818,11 @@
             <a:noAutofit/>
           </a:bodyPr>
           <a:p>
+            <a:pPr>
+              <a:lnSpc>
+                <a:spcPct val="100000"/>
+              </a:lnSpc>
+            </a:pPr>
             <a:endParaRPr b="0" lang="es-CO" sz="1800" spc="-1" strike="noStrike">
               <a:solidFill>
                 <a:srgbClr val="000000"/>
@@ -11795,13 +11835,13 @@
       <p:sp>
         <p:nvSpPr>
           <p:cNvPr id="108" name=""/>
-          <p:cNvSpPr txBox="1"/>
+          <p:cNvSpPr/>
           <p:nvPr/>
         </p:nvSpPr>
         <p:spPr>
           <a:xfrm>
             <a:off x="3060000" y="2290320"/>
-            <a:ext cx="6840000" cy="3469680"/>
+            <a:ext cx="6839640" cy="3469320"/>
           </a:xfrm>
           <a:prstGeom prst="rect">
             <a:avLst/>
@@ -11811,11 +11851,22 @@
             <a:noFill/>
           </a:ln>
         </p:spPr>
+        <p:style>
+          <a:lnRef idx="0"/>
+          <a:fillRef idx="0"/>
+          <a:effectRef idx="0"/>
+          <a:fontRef idx="minor"/>
+        </p:style>
         <p:txBody>
           <a:bodyPr lIns="90000" rIns="90000" tIns="45000" bIns="45000" anchor="t">
             <a:noAutofit/>
           </a:bodyPr>
           <a:p>
+            <a:pPr>
+              <a:lnSpc>
+                <a:spcPct val="100000"/>
+              </a:lnSpc>
+            </a:pPr>
             <a:r>
               <a:rPr b="0" lang="es-CO" sz="2600" spc="-1" strike="noStrike">
                 <a:solidFill>
@@ -11827,12 +11878,17 @@
             </a:r>
             <a:endParaRPr b="0" lang="es-CO" sz="2600" spc="-1" strike="noStrike">
               <a:solidFill>
-                <a:srgbClr val="ffffd7"/>
+                <a:srgbClr val="000000"/>
               </a:solidFill>
               <a:latin typeface="Arial"/>
             </a:endParaRPr>
           </a:p>
           <a:p>
+            <a:pPr>
+              <a:lnSpc>
+                <a:spcPct val="100000"/>
+              </a:lnSpc>
+            </a:pPr>
             <a:r>
               <a:rPr b="0" lang="es-CO" sz="2600" spc="-1" strike="noStrike">
                 <a:solidFill>
@@ -11844,12 +11900,17 @@
             </a:r>
             <a:endParaRPr b="0" lang="es-CO" sz="2600" spc="-1" strike="noStrike">
               <a:solidFill>
-                <a:srgbClr val="ffffd7"/>
+                <a:srgbClr val="000000"/>
               </a:solidFill>
               <a:latin typeface="Arial"/>
             </a:endParaRPr>
           </a:p>
           <a:p>
+            <a:pPr>
+              <a:lnSpc>
+                <a:spcPct val="100000"/>
+              </a:lnSpc>
+            </a:pPr>
             <a:r>
               <a:rPr b="0" lang="es-CO" sz="2600" spc="-1" strike="noStrike">
                 <a:solidFill>
@@ -11861,12 +11922,17 @@
             </a:r>
             <a:endParaRPr b="0" lang="es-CO" sz="2600" spc="-1" strike="noStrike">
               <a:solidFill>
-                <a:srgbClr val="ffffd7"/>
+                <a:srgbClr val="000000"/>
               </a:solidFill>
               <a:latin typeface="Arial"/>
             </a:endParaRPr>
           </a:p>
           <a:p>
+            <a:pPr>
+              <a:lnSpc>
+                <a:spcPct val="100000"/>
+              </a:lnSpc>
+            </a:pPr>
             <a:r>
               <a:rPr b="0" lang="es-CO" sz="2600" spc="-1" strike="noStrike">
                 <a:solidFill>
@@ -11874,16 +11940,21 @@
                 </a:solidFill>
                 <a:latin typeface="Arial"/>
               </a:rPr>
-              <a:t>Exactitud y corrección</a:t>
+              <a:t>Exactitud y correctitud</a:t>
             </a:r>
             <a:endParaRPr b="0" lang="es-CO" sz="2600" spc="-1" strike="noStrike">
               <a:solidFill>
-                <a:srgbClr val="ffffd7"/>
+                <a:srgbClr val="000000"/>
               </a:solidFill>
               <a:latin typeface="Arial"/>
             </a:endParaRPr>
           </a:p>
           <a:p>
+            <a:pPr>
+              <a:lnSpc>
+                <a:spcPct val="100000"/>
+              </a:lnSpc>
+            </a:pPr>
             <a:r>
               <a:rPr b="0" lang="es-CO" sz="2600" spc="-1" strike="noStrike">
                 <a:solidFill>
@@ -11895,15 +11966,20 @@
             </a:r>
             <a:endParaRPr b="0" lang="es-CO" sz="2600" spc="-1" strike="noStrike">
               <a:solidFill>
-                <a:srgbClr val="ffffd7"/>
+                <a:srgbClr val="000000"/>
               </a:solidFill>
               <a:latin typeface="Arial"/>
             </a:endParaRPr>
           </a:p>
           <a:p>
+            <a:pPr>
+              <a:lnSpc>
+                <a:spcPct val="100000"/>
+              </a:lnSpc>
+            </a:pPr>
             <a:endParaRPr b="0" lang="es-CO" sz="1000" spc="-1" strike="noStrike">
               <a:solidFill>
-                <a:srgbClr val="ffffd7"/>
+                <a:srgbClr val="000000"/>
               </a:solidFill>
               <a:latin typeface="Arial"/>
             </a:endParaRPr>
@@ -11949,9 +12025,9 @@
         <p:grpSpPr>
           <a:xfrm>
             <a:off x="360" y="-17640"/>
-            <a:ext cx="12189960" cy="6855840"/>
+            <a:ext cx="12189600" cy="6855480"/>
             <a:chOff x="360" y="-17640"/>
-            <a:chExt cx="12189960" cy="6855840"/>
+            <a:chExt cx="12189600" cy="6855480"/>
           </a:xfrm>
         </p:grpSpPr>
         <p:pic>
@@ -11968,7 +12044,7 @@
           <p:spPr>
             <a:xfrm>
               <a:off x="360" y="-17640"/>
-              <a:ext cx="12189960" cy="6855840"/>
+              <a:ext cx="12189600" cy="6855480"/>
             </a:xfrm>
             <a:prstGeom prst="rect">
               <a:avLst/>
@@ -11991,7 +12067,7 @@
           <p:spPr>
             <a:xfrm>
               <a:off x="360" y="-17640"/>
-              <a:ext cx="12189960" cy="6855840"/>
+              <a:ext cx="12189600" cy="6855480"/>
             </a:xfrm>
             <a:prstGeom prst="rect">
               <a:avLst/>
@@ -12015,7 +12091,7 @@
         <p:spPr>
           <a:xfrm>
             <a:off x="4815360" y="165600"/>
-            <a:ext cx="2337120" cy="1118520"/>
+            <a:ext cx="2336760" cy="1118160"/>
           </a:xfrm>
           <a:prstGeom prst="rect">
             <a:avLst/>
@@ -12034,9 +12110,9 @@
         <p:grpSpPr>
           <a:xfrm>
             <a:off x="626400" y="254520"/>
-            <a:ext cx="11249280" cy="981000"/>
+            <a:ext cx="11248920" cy="980640"/>
             <a:chOff x="626400" y="254520"/>
-            <a:chExt cx="11249280" cy="981000"/>
+            <a:chExt cx="11248920" cy="980640"/>
           </a:xfrm>
         </p:grpSpPr>
         <p:pic>
@@ -12052,7 +12128,7 @@
           <p:spPr>
             <a:xfrm>
               <a:off x="10059840" y="254520"/>
-              <a:ext cx="1815840" cy="981000"/>
+              <a:ext cx="1815480" cy="980640"/>
             </a:xfrm>
             <a:prstGeom prst="rect">
               <a:avLst/>
@@ -12075,7 +12151,7 @@
           <p:spPr>
             <a:xfrm>
               <a:off x="626400" y="484200"/>
-              <a:ext cx="1503720" cy="522360"/>
+              <a:ext cx="1503360" cy="522000"/>
             </a:xfrm>
             <a:prstGeom prst="rect">
               <a:avLst/>
@@ -12095,7 +12171,7 @@
         <p:spPr>
           <a:xfrm>
             <a:off x="1440720" y="900000"/>
-            <a:ext cx="9358920" cy="638280"/>
+            <a:ext cx="9358560" cy="638280"/>
           </a:xfrm>
           <a:prstGeom prst="rect">
             <a:avLst/>
@@ -12158,7 +12234,7 @@
         <p:spPr>
           <a:xfrm>
             <a:off x="1271880" y="1232280"/>
-            <a:ext cx="3947040" cy="485640"/>
+            <a:ext cx="3946680" cy="485280"/>
           </a:xfrm>
           <a:prstGeom prst="rect">
             <a:avLst/>
@@ -12179,6 +12255,11 @@
             <a:noAutofit/>
           </a:bodyPr>
           <a:p>
+            <a:pPr>
+              <a:lnSpc>
+                <a:spcPct val="100000"/>
+              </a:lnSpc>
+            </a:pPr>
             <a:endParaRPr b="0" lang="es-CO" sz="1800" spc="-1" strike="noStrike">
               <a:solidFill>
                 <a:srgbClr val="000000"/>
@@ -12201,7 +12282,7 @@
         <p:spPr>
           <a:xfrm>
             <a:off x="1800000" y="1717920"/>
-            <a:ext cx="7947360" cy="4467240"/>
+            <a:ext cx="7947000" cy="4466880"/>
           </a:xfrm>
           <a:prstGeom prst="rect">
             <a:avLst/>
@@ -12250,9 +12331,9 @@
         <p:grpSpPr>
           <a:xfrm>
             <a:off x="360" y="-17640"/>
-            <a:ext cx="12189960" cy="6855840"/>
+            <a:ext cx="12189600" cy="6855480"/>
             <a:chOff x="360" y="-17640"/>
-            <a:chExt cx="12189960" cy="6855840"/>
+            <a:chExt cx="12189600" cy="6855480"/>
           </a:xfrm>
         </p:grpSpPr>
         <p:pic>
@@ -12269,7 +12350,7 @@
           <p:spPr>
             <a:xfrm>
               <a:off x="360" y="-17640"/>
-              <a:ext cx="12189960" cy="6855840"/>
+              <a:ext cx="12189600" cy="6855480"/>
             </a:xfrm>
             <a:prstGeom prst="rect">
               <a:avLst/>
@@ -12292,7 +12373,7 @@
           <p:spPr>
             <a:xfrm>
               <a:off x="360" y="-17640"/>
-              <a:ext cx="12189960" cy="6855840"/>
+              <a:ext cx="12189600" cy="6855480"/>
             </a:xfrm>
             <a:prstGeom prst="rect">
               <a:avLst/>
@@ -12316,7 +12397,7 @@
         <p:spPr>
           <a:xfrm>
             <a:off x="4815360" y="165600"/>
-            <a:ext cx="2337120" cy="1118520"/>
+            <a:ext cx="2336760" cy="1118160"/>
           </a:xfrm>
           <a:prstGeom prst="rect">
             <a:avLst/>
@@ -12335,9 +12416,9 @@
         <p:grpSpPr>
           <a:xfrm>
             <a:off x="626400" y="254520"/>
-            <a:ext cx="11249280" cy="981000"/>
+            <a:ext cx="11248920" cy="980640"/>
             <a:chOff x="626400" y="254520"/>
-            <a:chExt cx="11249280" cy="981000"/>
+            <a:chExt cx="11248920" cy="980640"/>
           </a:xfrm>
         </p:grpSpPr>
         <p:pic>
@@ -12353,7 +12434,7 @@
           <p:spPr>
             <a:xfrm>
               <a:off x="10059840" y="254520"/>
-              <a:ext cx="1815840" cy="981000"/>
+              <a:ext cx="1815480" cy="980640"/>
             </a:xfrm>
             <a:prstGeom prst="rect">
               <a:avLst/>
@@ -12376,7 +12457,7 @@
           <p:spPr>
             <a:xfrm>
               <a:off x="626400" y="484200"/>
-              <a:ext cx="1503720" cy="522360"/>
+              <a:ext cx="1503360" cy="522000"/>
             </a:xfrm>
             <a:prstGeom prst="rect">
               <a:avLst/>
@@ -12396,7 +12477,7 @@
         <p:spPr>
           <a:xfrm>
             <a:off x="1440720" y="900000"/>
-            <a:ext cx="9358920" cy="638280"/>
+            <a:ext cx="9358560" cy="638280"/>
           </a:xfrm>
           <a:prstGeom prst="rect">
             <a:avLst/>
@@ -12459,7 +12540,7 @@
         <p:spPr>
           <a:xfrm>
             <a:off x="1271880" y="1232280"/>
-            <a:ext cx="3947040" cy="485640"/>
+            <a:ext cx="3946680" cy="485280"/>
           </a:xfrm>
           <a:prstGeom prst="rect">
             <a:avLst/>
@@ -12480,6 +12561,11 @@
             <a:noAutofit/>
           </a:bodyPr>
           <a:p>
+            <a:pPr>
+              <a:lnSpc>
+                <a:spcPct val="100000"/>
+              </a:lnSpc>
+            </a:pPr>
             <a:endParaRPr b="0" lang="es-CO" sz="1800" spc="-1" strike="noStrike">
               <a:solidFill>
                 <a:srgbClr val="000000"/>
@@ -12502,7 +12588,7 @@
         <p:spPr>
           <a:xfrm>
             <a:off x="245160" y="1701000"/>
-            <a:ext cx="5874840" cy="2799000"/>
+            <a:ext cx="5874480" cy="2798640"/>
           </a:xfrm>
           <a:prstGeom prst="rect">
             <a:avLst/>
@@ -12525,7 +12611,7 @@
         <p:spPr>
           <a:xfrm>
             <a:off x="6642720" y="1620000"/>
-            <a:ext cx="4877280" cy="2929320"/>
+            <a:ext cx="4876920" cy="2928960"/>
           </a:xfrm>
           <a:prstGeom prst="rect">
             <a:avLst/>
@@ -12538,13 +12624,13 @@
       <p:sp>
         <p:nvSpPr>
           <p:cNvPr id="130" name=""/>
-          <p:cNvSpPr txBox="1"/>
+          <p:cNvSpPr/>
           <p:nvPr/>
         </p:nvSpPr>
         <p:spPr>
           <a:xfrm>
             <a:off x="2756160" y="4680000"/>
-            <a:ext cx="1923840" cy="772560"/>
+            <a:ext cx="1923480" cy="772200"/>
           </a:xfrm>
           <a:prstGeom prst="rect">
             <a:avLst/>
@@ -12554,11 +12640,22 @@
             <a:noFill/>
           </a:ln>
         </p:spPr>
+        <p:style>
+          <a:lnRef idx="0"/>
+          <a:fillRef idx="0"/>
+          <a:effectRef idx="0"/>
+          <a:fontRef idx="minor"/>
+        </p:style>
         <p:txBody>
           <a:bodyPr lIns="90000" rIns="90000" tIns="45000" bIns="45000" anchor="t">
             <a:noAutofit/>
           </a:bodyPr>
           <a:p>
+            <a:pPr>
+              <a:lnSpc>
+                <a:spcPct val="100000"/>
+              </a:lnSpc>
+            </a:pPr>
             <a:r>
               <a:rPr b="0" lang="es-CO" sz="2600" spc="-1" strike="noStrike">
                 <a:solidFill>
@@ -12570,7 +12667,7 @@
             </a:r>
             <a:endParaRPr b="0" lang="es-CO" sz="2600" spc="-1" strike="noStrike">
               <a:solidFill>
-                <a:srgbClr val="ffffd7"/>
+                <a:srgbClr val="000000"/>
               </a:solidFill>
               <a:latin typeface="Arial"/>
             </a:endParaRPr>
@@ -12580,13 +12677,13 @@
       <p:sp>
         <p:nvSpPr>
           <p:cNvPr id="131" name=""/>
-          <p:cNvSpPr txBox="1"/>
+          <p:cNvSpPr/>
           <p:nvPr/>
         </p:nvSpPr>
         <p:spPr>
           <a:xfrm>
             <a:off x="8460000" y="4807440"/>
-            <a:ext cx="1980000" cy="1197360"/>
+            <a:ext cx="1979640" cy="1197000"/>
           </a:xfrm>
           <a:prstGeom prst="rect">
             <a:avLst/>
@@ -12596,11 +12693,22 @@
             <a:noFill/>
           </a:ln>
         </p:spPr>
+        <p:style>
+          <a:lnRef idx="0"/>
+          <a:fillRef idx="0"/>
+          <a:effectRef idx="0"/>
+          <a:fontRef idx="minor"/>
+        </p:style>
         <p:txBody>
           <a:bodyPr lIns="90000" rIns="90000" tIns="45000" bIns="45000" anchor="t">
             <a:noAutofit/>
           </a:bodyPr>
           <a:p>
+            <a:pPr>
+              <a:lnSpc>
+                <a:spcPct val="100000"/>
+              </a:lnSpc>
+            </a:pPr>
             <a:r>
               <a:rPr b="0" lang="es-CO" sz="2600" spc="-1" strike="noStrike">
                 <a:solidFill>
@@ -12612,7 +12720,7 @@
             </a:r>
             <a:endParaRPr b="0" lang="es-CO" sz="2600" spc="-1" strike="noStrike">
               <a:solidFill>
-                <a:srgbClr val="ffffd7"/>
+                <a:srgbClr val="000000"/>
               </a:solidFill>
               <a:latin typeface="Arial"/>
             </a:endParaRPr>
@@ -12658,9 +12766,9 @@
         <p:grpSpPr>
           <a:xfrm>
             <a:off x="360" y="-17640"/>
-            <a:ext cx="12189960" cy="6855840"/>
+            <a:ext cx="12189600" cy="6855480"/>
             <a:chOff x="360" y="-17640"/>
-            <a:chExt cx="12189960" cy="6855840"/>
+            <a:chExt cx="12189600" cy="6855480"/>
           </a:xfrm>
         </p:grpSpPr>
         <p:pic>
@@ -12677,7 +12785,7 @@
           <p:spPr>
             <a:xfrm>
               <a:off x="360" y="-17640"/>
-              <a:ext cx="12189960" cy="6855840"/>
+              <a:ext cx="12189600" cy="6855480"/>
             </a:xfrm>
             <a:prstGeom prst="rect">
               <a:avLst/>
@@ -12700,7 +12808,7 @@
           <p:spPr>
             <a:xfrm>
               <a:off x="360" y="-17640"/>
-              <a:ext cx="12189960" cy="6855840"/>
+              <a:ext cx="12189600" cy="6855480"/>
             </a:xfrm>
             <a:prstGeom prst="rect">
               <a:avLst/>
@@ -12724,7 +12832,7 @@
         <p:spPr>
           <a:xfrm>
             <a:off x="4815360" y="165600"/>
-            <a:ext cx="2337120" cy="1118520"/>
+            <a:ext cx="2336760" cy="1118160"/>
           </a:xfrm>
           <a:prstGeom prst="rect">
             <a:avLst/>
@@ -12743,9 +12851,9 @@
         <p:grpSpPr>
           <a:xfrm>
             <a:off x="626400" y="254520"/>
-            <a:ext cx="11249280" cy="981000"/>
+            <a:ext cx="11248920" cy="980640"/>
             <a:chOff x="626400" y="254520"/>
-            <a:chExt cx="11249280" cy="981000"/>
+            <a:chExt cx="11248920" cy="980640"/>
           </a:xfrm>
         </p:grpSpPr>
         <p:pic>
@@ -12761,7 +12869,7 @@
           <p:spPr>
             <a:xfrm>
               <a:off x="10059840" y="254520"/>
-              <a:ext cx="1815840" cy="981000"/>
+              <a:ext cx="1815480" cy="980640"/>
             </a:xfrm>
             <a:prstGeom prst="rect">
               <a:avLst/>
@@ -12784,7 +12892,7 @@
           <p:spPr>
             <a:xfrm>
               <a:off x="626400" y="484200"/>
-              <a:ext cx="1503720" cy="522360"/>
+              <a:ext cx="1503360" cy="522000"/>
             </a:xfrm>
             <a:prstGeom prst="rect">
               <a:avLst/>
@@ -12804,7 +12912,7 @@
         <p:spPr>
           <a:xfrm>
             <a:off x="1440720" y="900000"/>
-            <a:ext cx="9358920" cy="638280"/>
+            <a:ext cx="9358560" cy="638280"/>
           </a:xfrm>
           <a:prstGeom prst="rect">
             <a:avLst/>
@@ -12867,7 +12975,7 @@
         <p:spPr>
           <a:xfrm>
             <a:off x="1271880" y="1232280"/>
-            <a:ext cx="3947040" cy="485640"/>
+            <a:ext cx="3946680" cy="485280"/>
           </a:xfrm>
           <a:prstGeom prst="rect">
             <a:avLst/>
@@ -12888,6 +12996,11 @@
             <a:noAutofit/>
           </a:bodyPr>
           <a:p>
+            <a:pPr>
+              <a:lnSpc>
+                <a:spcPct val="100000"/>
+              </a:lnSpc>
+            </a:pPr>
             <a:endParaRPr b="0" lang="es-CO" sz="1800" spc="-1" strike="noStrike">
               <a:solidFill>
                 <a:srgbClr val="000000"/>
@@ -12910,7 +13023,7 @@
         <p:spPr>
           <a:xfrm>
             <a:off x="1744920" y="1800000"/>
-            <a:ext cx="7615080" cy="4283280"/>
+            <a:ext cx="7614720" cy="4282920"/>
           </a:xfrm>
           <a:prstGeom prst="rect">
             <a:avLst/>
@@ -12959,9 +13072,9 @@
         <p:grpSpPr>
           <a:xfrm>
             <a:off x="360" y="-17640"/>
-            <a:ext cx="12189960" cy="6855840"/>
+            <a:ext cx="12189600" cy="6855480"/>
             <a:chOff x="360" y="-17640"/>
-            <a:chExt cx="12189960" cy="6855840"/>
+            <a:chExt cx="12189600" cy="6855480"/>
           </a:xfrm>
         </p:grpSpPr>
         <p:pic>
@@ -12978,7 +13091,7 @@
           <p:spPr>
             <a:xfrm>
               <a:off x="360" y="-17640"/>
-              <a:ext cx="12189960" cy="6855840"/>
+              <a:ext cx="12189600" cy="6855480"/>
             </a:xfrm>
             <a:prstGeom prst="rect">
               <a:avLst/>
@@ -13001,7 +13114,7 @@
           <p:spPr>
             <a:xfrm>
               <a:off x="360" y="-17640"/>
-              <a:ext cx="12189960" cy="6855840"/>
+              <a:ext cx="12189600" cy="6855480"/>
             </a:xfrm>
             <a:prstGeom prst="rect">
               <a:avLst/>
@@ -13025,7 +13138,7 @@
         <p:spPr>
           <a:xfrm>
             <a:off x="4815360" y="165600"/>
-            <a:ext cx="2337120" cy="1118520"/>
+            <a:ext cx="2336760" cy="1118160"/>
           </a:xfrm>
           <a:prstGeom prst="rect">
             <a:avLst/>
@@ -13044,9 +13157,9 @@
         <p:grpSpPr>
           <a:xfrm>
             <a:off x="626400" y="254520"/>
-            <a:ext cx="11249280" cy="981000"/>
+            <a:ext cx="11248920" cy="980640"/>
             <a:chOff x="626400" y="254520"/>
-            <a:chExt cx="11249280" cy="981000"/>
+            <a:chExt cx="11248920" cy="980640"/>
           </a:xfrm>
         </p:grpSpPr>
         <p:pic>
@@ -13062,7 +13175,7 @@
           <p:spPr>
             <a:xfrm>
               <a:off x="10059840" y="254520"/>
-              <a:ext cx="1815840" cy="981000"/>
+              <a:ext cx="1815480" cy="980640"/>
             </a:xfrm>
             <a:prstGeom prst="rect">
               <a:avLst/>
@@ -13085,7 +13198,7 @@
           <p:spPr>
             <a:xfrm>
               <a:off x="626400" y="484200"/>
-              <a:ext cx="1503720" cy="522360"/>
+              <a:ext cx="1503360" cy="522000"/>
             </a:xfrm>
             <a:prstGeom prst="rect">
               <a:avLst/>
@@ -13105,7 +13218,7 @@
         <p:spPr>
           <a:xfrm>
             <a:off x="1440720" y="900000"/>
-            <a:ext cx="9358920" cy="638280"/>
+            <a:ext cx="9358560" cy="638280"/>
           </a:xfrm>
           <a:prstGeom prst="rect">
             <a:avLst/>
@@ -13168,7 +13281,7 @@
         <p:spPr>
           <a:xfrm>
             <a:off x="1271880" y="1232280"/>
-            <a:ext cx="3947040" cy="485640"/>
+            <a:ext cx="3946680" cy="485280"/>
           </a:xfrm>
           <a:prstGeom prst="rect">
             <a:avLst/>
@@ -13189,6 +13302,11 @@
             <a:noAutofit/>
           </a:bodyPr>
           <a:p>
+            <a:pPr>
+              <a:lnSpc>
+                <a:spcPct val="100000"/>
+              </a:lnSpc>
+            </a:pPr>
             <a:endParaRPr b="0" lang="es-CO" sz="1800" spc="-1" strike="noStrike">
               <a:solidFill>
                 <a:srgbClr val="000000"/>
@@ -13211,7 +13329,7 @@
         <p:spPr>
           <a:xfrm>
             <a:off x="1800000" y="1980000"/>
-            <a:ext cx="7603920" cy="4149720"/>
+            <a:ext cx="7603560" cy="4149360"/>
           </a:xfrm>
           <a:prstGeom prst="rect">
             <a:avLst/>
@@ -13260,9 +13378,9 @@
         <p:grpSpPr>
           <a:xfrm>
             <a:off x="360" y="-17640"/>
-            <a:ext cx="12189960" cy="6855840"/>
+            <a:ext cx="12189600" cy="6855480"/>
             <a:chOff x="360" y="-17640"/>
-            <a:chExt cx="12189960" cy="6855840"/>
+            <a:chExt cx="12189600" cy="6855480"/>
           </a:xfrm>
         </p:grpSpPr>
         <p:pic>
@@ -13279,7 +13397,7 @@
           <p:spPr>
             <a:xfrm>
               <a:off x="360" y="-17640"/>
-              <a:ext cx="12189960" cy="6855840"/>
+              <a:ext cx="12189600" cy="6855480"/>
             </a:xfrm>
             <a:prstGeom prst="rect">
               <a:avLst/>
@@ -13302,7 +13420,7 @@
           <p:spPr>
             <a:xfrm>
               <a:off x="360" y="-17640"/>
-              <a:ext cx="12189960" cy="6855840"/>
+              <a:ext cx="12189600" cy="6855480"/>
             </a:xfrm>
             <a:prstGeom prst="rect">
               <a:avLst/>
@@ -13326,7 +13444,7 @@
         <p:spPr>
           <a:xfrm>
             <a:off x="4815360" y="165600"/>
-            <a:ext cx="2337120" cy="1118520"/>
+            <a:ext cx="2336760" cy="1118160"/>
           </a:xfrm>
           <a:prstGeom prst="rect">
             <a:avLst/>
@@ -13345,9 +13463,9 @@
         <p:grpSpPr>
           <a:xfrm>
             <a:off x="626400" y="254520"/>
-            <a:ext cx="11249280" cy="981000"/>
+            <a:ext cx="11248920" cy="980640"/>
             <a:chOff x="626400" y="254520"/>
-            <a:chExt cx="11249280" cy="981000"/>
+            <a:chExt cx="11248920" cy="980640"/>
           </a:xfrm>
         </p:grpSpPr>
         <p:pic>
@@ -13363,7 +13481,7 @@
           <p:spPr>
             <a:xfrm>
               <a:off x="10059840" y="254520"/>
-              <a:ext cx="1815840" cy="981000"/>
+              <a:ext cx="1815480" cy="980640"/>
             </a:xfrm>
             <a:prstGeom prst="rect">
               <a:avLst/>
@@ -13386,7 +13504,7 @@
           <p:spPr>
             <a:xfrm>
               <a:off x="626400" y="484200"/>
-              <a:ext cx="1503720" cy="522360"/>
+              <a:ext cx="1503360" cy="522000"/>
             </a:xfrm>
             <a:prstGeom prst="rect">
               <a:avLst/>
@@ -13406,7 +13524,7 @@
         <p:spPr>
           <a:xfrm>
             <a:off x="1440720" y="900000"/>
-            <a:ext cx="9358920" cy="638280"/>
+            <a:ext cx="9358560" cy="638280"/>
           </a:xfrm>
           <a:prstGeom prst="rect">
             <a:avLst/>
@@ -13469,7 +13587,7 @@
         <p:spPr>
           <a:xfrm>
             <a:off x="1271880" y="1232280"/>
-            <a:ext cx="3947040" cy="485640"/>
+            <a:ext cx="3946680" cy="485280"/>
           </a:xfrm>
           <a:prstGeom prst="rect">
             <a:avLst/>
@@ -13490,6 +13608,11 @@
             <a:noAutofit/>
           </a:bodyPr>
           <a:p>
+            <a:pPr>
+              <a:lnSpc>
+                <a:spcPct val="100000"/>
+              </a:lnSpc>
+            </a:pPr>
             <a:endParaRPr b="0" lang="es-CO" sz="1800" spc="-1" strike="noStrike">
               <a:solidFill>
                 <a:srgbClr val="000000"/>
@@ -13512,7 +13635,7 @@
         <p:spPr>
           <a:xfrm>
             <a:off x="1876680" y="1669320"/>
-            <a:ext cx="8923320" cy="4990680"/>
+            <a:ext cx="8922960" cy="4990320"/>
           </a:xfrm>
           <a:prstGeom prst="rect">
             <a:avLst/>

</xml_diff>